<commit_message>
farben geändert und vorstellungsfolie
</commit_message>
<xml_diff>
--- a/Powerpoint.pptx
+++ b/Powerpoint.pptx
@@ -4,11 +4,15 @@
   <p:sldMasterIdLst>
     <p:sldMasterId id="2147483675" r:id="rId1"/>
   </p:sldMasterIdLst>
+  <p:notesMasterIdLst>
+    <p:notesMasterId r:id="rId7"/>
+  </p:notesMasterIdLst>
   <p:sldIdLst>
     <p:sldId id="256" r:id="rId2"/>
-    <p:sldId id="257" r:id="rId3"/>
-    <p:sldId id="258" r:id="rId4"/>
-    <p:sldId id="259" r:id="rId5"/>
+    <p:sldId id="260" r:id="rId3"/>
+    <p:sldId id="257" r:id="rId4"/>
+    <p:sldId id="258" r:id="rId5"/>
+    <p:sldId id="259" r:id="rId6"/>
   </p:sldIdLst>
   <p:sldSz cx="12192000" cy="6858000"/>
   <p:notesSz cx="6858000" cy="9144000"/>
@@ -113,6 +117,355 @@
     </p:ext>
   </p:extLst>
 </p:presentation>
+</file>
+
+<file path=ppt/notesMasters/notesMaster1.xml><?xml version="1.0" encoding="utf-8"?>
+<p:notesMaster xmlns:a="http://schemas.openxmlformats.org/drawingml/2006/main" xmlns:r="http://schemas.openxmlformats.org/officeDocument/2006/relationships" xmlns:p="http://schemas.openxmlformats.org/presentationml/2006/main">
+  <p:cSld>
+    <p:bg>
+      <p:bgRef idx="1001">
+        <a:schemeClr val="bg1"/>
+      </p:bgRef>
+    </p:bg>
+    <p:spTree>
+      <p:nvGrpSpPr>
+        <p:cNvPr id="1" name=""/>
+        <p:cNvGrpSpPr/>
+        <p:nvPr/>
+      </p:nvGrpSpPr>
+      <p:grpSpPr>
+        <a:xfrm>
+          <a:off x="0" y="0"/>
+          <a:ext cx="0" cy="0"/>
+          <a:chOff x="0" y="0"/>
+          <a:chExt cx="0" cy="0"/>
+        </a:xfrm>
+      </p:grpSpPr>
+      <p:sp>
+        <p:nvSpPr>
+          <p:cNvPr id="2" name="Kopfzeilenplatzhalter 1"/>
+          <p:cNvSpPr>
+            <a:spLocks noGrp="1"/>
+          </p:cNvSpPr>
+          <p:nvPr>
+            <p:ph type="hdr" sz="quarter"/>
+          </p:nvPr>
+        </p:nvSpPr>
+        <p:spPr>
+          <a:xfrm>
+            <a:off x="0" y="0"/>
+            <a:ext cx="2971800" cy="458788"/>
+          </a:xfrm>
+          <a:prstGeom prst="rect">
+            <a:avLst/>
+          </a:prstGeom>
+        </p:spPr>
+        <p:txBody>
+          <a:bodyPr vert="horz" lIns="91440" tIns="45720" rIns="91440" bIns="45720" rtlCol="0"/>
+          <a:lstStyle>
+            <a:lvl1pPr algn="l">
+              <a:defRPr sz="1200"/>
+            </a:lvl1pPr>
+          </a:lstStyle>
+          <a:p>
+            <a:endParaRPr lang="de-DE"/>
+          </a:p>
+        </p:txBody>
+      </p:sp>
+      <p:sp>
+        <p:nvSpPr>
+          <p:cNvPr id="3" name="Datumsplatzhalter 2"/>
+          <p:cNvSpPr>
+            <a:spLocks noGrp="1"/>
+          </p:cNvSpPr>
+          <p:nvPr>
+            <p:ph type="dt" idx="1"/>
+          </p:nvPr>
+        </p:nvSpPr>
+        <p:spPr>
+          <a:xfrm>
+            <a:off x="3884613" y="0"/>
+            <a:ext cx="2971800" cy="458788"/>
+          </a:xfrm>
+          <a:prstGeom prst="rect">
+            <a:avLst/>
+          </a:prstGeom>
+        </p:spPr>
+        <p:txBody>
+          <a:bodyPr vert="horz" lIns="91440" tIns="45720" rIns="91440" bIns="45720" rtlCol="0"/>
+          <a:lstStyle>
+            <a:lvl1pPr algn="r">
+              <a:defRPr sz="1200"/>
+            </a:lvl1pPr>
+          </a:lstStyle>
+          <a:p>
+            <a:fld id="{5DC61D23-D5AC-45DB-895E-5B4795B49E41}" type="datetimeFigureOut">
+              <a:rPr lang="de-DE" smtClean="0"/>
+              <a:t>21.09.2019</a:t>
+            </a:fld>
+            <a:endParaRPr lang="de-DE"/>
+          </a:p>
+        </p:txBody>
+      </p:sp>
+      <p:sp>
+        <p:nvSpPr>
+          <p:cNvPr id="4" name="Folienbildplatzhalter 3"/>
+          <p:cNvSpPr>
+            <a:spLocks noGrp="1" noRot="1" noChangeAspect="1"/>
+          </p:cNvSpPr>
+          <p:nvPr>
+            <p:ph type="sldImg" idx="2"/>
+          </p:nvPr>
+        </p:nvSpPr>
+        <p:spPr>
+          <a:xfrm>
+            <a:off x="685800" y="1143000"/>
+            <a:ext cx="5486400" cy="3086100"/>
+          </a:xfrm>
+          <a:prstGeom prst="rect">
+            <a:avLst/>
+          </a:prstGeom>
+          <a:noFill/>
+          <a:ln w="12700">
+            <a:solidFill>
+              <a:prstClr val="black"/>
+            </a:solidFill>
+          </a:ln>
+        </p:spPr>
+        <p:txBody>
+          <a:bodyPr vert="horz" lIns="91440" tIns="45720" rIns="91440" bIns="45720" rtlCol="0" anchor="ctr"/>
+          <a:lstStyle/>
+          <a:p>
+            <a:endParaRPr lang="de-DE"/>
+          </a:p>
+        </p:txBody>
+      </p:sp>
+      <p:sp>
+        <p:nvSpPr>
+          <p:cNvPr id="5" name="Notizenplatzhalter 4"/>
+          <p:cNvSpPr>
+            <a:spLocks noGrp="1"/>
+          </p:cNvSpPr>
+          <p:nvPr>
+            <p:ph type="body" sz="quarter" idx="3"/>
+          </p:nvPr>
+        </p:nvSpPr>
+        <p:spPr>
+          <a:xfrm>
+            <a:off x="685800" y="4400550"/>
+            <a:ext cx="5486400" cy="3600450"/>
+          </a:xfrm>
+          <a:prstGeom prst="rect">
+            <a:avLst/>
+          </a:prstGeom>
+        </p:spPr>
+        <p:txBody>
+          <a:bodyPr vert="horz" lIns="91440" tIns="45720" rIns="91440" bIns="45720" rtlCol="0"/>
+          <a:lstStyle/>
+          <a:p>
+            <a:pPr lvl="0"/>
+            <a:r>
+              <a:rPr lang="de-DE"/>
+              <a:t>Mastertextformat bearbeiten</a:t>
+            </a:r>
+          </a:p>
+          <a:p>
+            <a:pPr lvl="1"/>
+            <a:r>
+              <a:rPr lang="de-DE"/>
+              <a:t>Zweite Ebene</a:t>
+            </a:r>
+          </a:p>
+          <a:p>
+            <a:pPr lvl="2"/>
+            <a:r>
+              <a:rPr lang="de-DE"/>
+              <a:t>Dritte Ebene</a:t>
+            </a:r>
+          </a:p>
+          <a:p>
+            <a:pPr lvl="3"/>
+            <a:r>
+              <a:rPr lang="de-DE"/>
+              <a:t>Vierte Ebene</a:t>
+            </a:r>
+          </a:p>
+          <a:p>
+            <a:pPr lvl="4"/>
+            <a:r>
+              <a:rPr lang="de-DE"/>
+              <a:t>Fünfte Ebene</a:t>
+            </a:r>
+          </a:p>
+        </p:txBody>
+      </p:sp>
+      <p:sp>
+        <p:nvSpPr>
+          <p:cNvPr id="6" name="Fußzeilenplatzhalter 5"/>
+          <p:cNvSpPr>
+            <a:spLocks noGrp="1"/>
+          </p:cNvSpPr>
+          <p:nvPr>
+            <p:ph type="ftr" sz="quarter" idx="4"/>
+          </p:nvPr>
+        </p:nvSpPr>
+        <p:spPr>
+          <a:xfrm>
+            <a:off x="0" y="8685213"/>
+            <a:ext cx="2971800" cy="458787"/>
+          </a:xfrm>
+          <a:prstGeom prst="rect">
+            <a:avLst/>
+          </a:prstGeom>
+        </p:spPr>
+        <p:txBody>
+          <a:bodyPr vert="horz" lIns="91440" tIns="45720" rIns="91440" bIns="45720" rtlCol="0" anchor="b"/>
+          <a:lstStyle>
+            <a:lvl1pPr algn="l">
+              <a:defRPr sz="1200"/>
+            </a:lvl1pPr>
+          </a:lstStyle>
+          <a:p>
+            <a:endParaRPr lang="de-DE"/>
+          </a:p>
+        </p:txBody>
+      </p:sp>
+      <p:sp>
+        <p:nvSpPr>
+          <p:cNvPr id="7" name="Foliennummernplatzhalter 6"/>
+          <p:cNvSpPr>
+            <a:spLocks noGrp="1"/>
+          </p:cNvSpPr>
+          <p:nvPr>
+            <p:ph type="sldNum" sz="quarter" idx="5"/>
+          </p:nvPr>
+        </p:nvSpPr>
+        <p:spPr>
+          <a:xfrm>
+            <a:off x="3884613" y="8685213"/>
+            <a:ext cx="2971800" cy="458787"/>
+          </a:xfrm>
+          <a:prstGeom prst="rect">
+            <a:avLst/>
+          </a:prstGeom>
+        </p:spPr>
+        <p:txBody>
+          <a:bodyPr vert="horz" lIns="91440" tIns="45720" rIns="91440" bIns="45720" rtlCol="0" anchor="b"/>
+          <a:lstStyle>
+            <a:lvl1pPr algn="r">
+              <a:defRPr sz="1200"/>
+            </a:lvl1pPr>
+          </a:lstStyle>
+          <a:p>
+            <a:fld id="{99BC2B50-C190-443B-8946-0CADED42AC0A}" type="slidenum">
+              <a:rPr lang="de-DE" smtClean="0"/>
+              <a:t>‹Nr.›</a:t>
+            </a:fld>
+            <a:endParaRPr lang="de-DE"/>
+          </a:p>
+        </p:txBody>
+      </p:sp>
+    </p:spTree>
+    <p:extLst>
+      <p:ext uri="{BB962C8B-B14F-4D97-AF65-F5344CB8AC3E}">
+        <p14:creationId xmlns:p14="http://schemas.microsoft.com/office/powerpoint/2010/main" val="394479126"/>
+      </p:ext>
+    </p:extLst>
+  </p:cSld>
+  <p:clrMap bg1="lt1" tx1="dk1" bg2="lt2" tx2="dk2" accent1="accent1" accent2="accent2" accent3="accent3" accent4="accent4" accent5="accent5" accent6="accent6" hlink="hlink" folHlink="folHlink"/>
+  <p:notesStyle>
+    <a:lvl1pPr marL="0" algn="l" defTabSz="914400" rtl="0" eaLnBrk="1" latinLnBrk="0" hangingPunct="1">
+      <a:defRPr sz="1200" kern="1200">
+        <a:solidFill>
+          <a:schemeClr val="tx1"/>
+        </a:solidFill>
+        <a:latin typeface="+mn-lt"/>
+        <a:ea typeface="+mn-ea"/>
+        <a:cs typeface="+mn-cs"/>
+      </a:defRPr>
+    </a:lvl1pPr>
+    <a:lvl2pPr marL="457200" algn="l" defTabSz="914400" rtl="0" eaLnBrk="1" latinLnBrk="0" hangingPunct="1">
+      <a:defRPr sz="1200" kern="1200">
+        <a:solidFill>
+          <a:schemeClr val="tx1"/>
+        </a:solidFill>
+        <a:latin typeface="+mn-lt"/>
+        <a:ea typeface="+mn-ea"/>
+        <a:cs typeface="+mn-cs"/>
+      </a:defRPr>
+    </a:lvl2pPr>
+    <a:lvl3pPr marL="914400" algn="l" defTabSz="914400" rtl="0" eaLnBrk="1" latinLnBrk="0" hangingPunct="1">
+      <a:defRPr sz="1200" kern="1200">
+        <a:solidFill>
+          <a:schemeClr val="tx1"/>
+        </a:solidFill>
+        <a:latin typeface="+mn-lt"/>
+        <a:ea typeface="+mn-ea"/>
+        <a:cs typeface="+mn-cs"/>
+      </a:defRPr>
+    </a:lvl3pPr>
+    <a:lvl4pPr marL="1371600" algn="l" defTabSz="914400" rtl="0" eaLnBrk="1" latinLnBrk="0" hangingPunct="1">
+      <a:defRPr sz="1200" kern="1200">
+        <a:solidFill>
+          <a:schemeClr val="tx1"/>
+        </a:solidFill>
+        <a:latin typeface="+mn-lt"/>
+        <a:ea typeface="+mn-ea"/>
+        <a:cs typeface="+mn-cs"/>
+      </a:defRPr>
+    </a:lvl4pPr>
+    <a:lvl5pPr marL="1828800" algn="l" defTabSz="914400" rtl="0" eaLnBrk="1" latinLnBrk="0" hangingPunct="1">
+      <a:defRPr sz="1200" kern="1200">
+        <a:solidFill>
+          <a:schemeClr val="tx1"/>
+        </a:solidFill>
+        <a:latin typeface="+mn-lt"/>
+        <a:ea typeface="+mn-ea"/>
+        <a:cs typeface="+mn-cs"/>
+      </a:defRPr>
+    </a:lvl5pPr>
+    <a:lvl6pPr marL="2286000" algn="l" defTabSz="914400" rtl="0" eaLnBrk="1" latinLnBrk="0" hangingPunct="1">
+      <a:defRPr sz="1200" kern="1200">
+        <a:solidFill>
+          <a:schemeClr val="tx1"/>
+        </a:solidFill>
+        <a:latin typeface="+mn-lt"/>
+        <a:ea typeface="+mn-ea"/>
+        <a:cs typeface="+mn-cs"/>
+      </a:defRPr>
+    </a:lvl6pPr>
+    <a:lvl7pPr marL="2743200" algn="l" defTabSz="914400" rtl="0" eaLnBrk="1" latinLnBrk="0" hangingPunct="1">
+      <a:defRPr sz="1200" kern="1200">
+        <a:solidFill>
+          <a:schemeClr val="tx1"/>
+        </a:solidFill>
+        <a:latin typeface="+mn-lt"/>
+        <a:ea typeface="+mn-ea"/>
+        <a:cs typeface="+mn-cs"/>
+      </a:defRPr>
+    </a:lvl7pPr>
+    <a:lvl8pPr marL="3200400" algn="l" defTabSz="914400" rtl="0" eaLnBrk="1" latinLnBrk="0" hangingPunct="1">
+      <a:defRPr sz="1200" kern="1200">
+        <a:solidFill>
+          <a:schemeClr val="tx1"/>
+        </a:solidFill>
+        <a:latin typeface="+mn-lt"/>
+        <a:ea typeface="+mn-ea"/>
+        <a:cs typeface="+mn-cs"/>
+      </a:defRPr>
+    </a:lvl8pPr>
+    <a:lvl9pPr marL="3657600" algn="l" defTabSz="914400" rtl="0" eaLnBrk="1" latinLnBrk="0" hangingPunct="1">
+      <a:defRPr sz="1200" kern="1200">
+        <a:solidFill>
+          <a:schemeClr val="tx1"/>
+        </a:solidFill>
+        <a:latin typeface="+mn-lt"/>
+        <a:ea typeface="+mn-ea"/>
+        <a:cs typeface="+mn-cs"/>
+      </a:defRPr>
+    </a:lvl9pPr>
+  </p:notesStyle>
+</p:notesMaster>
 </file>
 
 <file path=ppt/slideLayouts/slideLayout1.xml><?xml version="1.0" encoding="utf-8"?>
@@ -3469,6 +3822,54 @@
           </a:p>
         </p:txBody>
       </p:sp>
+      <p:sp>
+        <p:nvSpPr>
+          <p:cNvPr id="4" name="Textfeld 3">
+            <a:extLst>
+              <a:ext uri="{FF2B5EF4-FFF2-40B4-BE49-F238E27FC236}">
+                <a16:creationId xmlns:a16="http://schemas.microsoft.com/office/drawing/2014/main" id="{EED29B05-1A10-40AC-B4B2-DE62BDC67DED}"/>
+              </a:ext>
+            </a:extLst>
+          </p:cNvPr>
+          <p:cNvSpPr txBox="1"/>
+          <p:nvPr/>
+        </p:nvSpPr>
+        <p:spPr>
+          <a:xfrm>
+            <a:off x="8503298" y="6440615"/>
+            <a:ext cx="3701143" cy="369332"/>
+          </a:xfrm>
+          <a:prstGeom prst="rect">
+            <a:avLst/>
+          </a:prstGeom>
+          <a:noFill/>
+        </p:spPr>
+        <p:txBody>
+          <a:bodyPr wrap="square" rtlCol="0">
+            <a:spAutoFit/>
+          </a:bodyPr>
+          <a:lstStyle/>
+          <a:p>
+            <a:r>
+              <a:rPr lang="de-DE" dirty="0"/>
+              <a:t>Von Rabea </a:t>
+            </a:r>
+            <a:r>
+              <a:rPr lang="de-DE" dirty="0" err="1"/>
+              <a:t>Kolsch</a:t>
+            </a:r>
+            <a:r>
+              <a:rPr lang="de-DE" dirty="0"/>
+              <a:t> und Mathis </a:t>
+            </a:r>
+            <a:r>
+              <a:rPr lang="de-DE" dirty="0" err="1"/>
+              <a:t>Gemke</a:t>
+            </a:r>
+            <a:endParaRPr lang="de-DE" dirty="0"/>
+          </a:p>
+        </p:txBody>
+      </p:sp>
     </p:spTree>
     <p:extLst>
       <p:ext uri="{BB962C8B-B14F-4D97-AF65-F5344CB8AC3E}">
@@ -3483,6 +3884,386 @@
 </file>
 
 <file path=ppt/slides/slide2.xml><?xml version="1.0" encoding="utf-8"?>
+<p:sld xmlns:a="http://schemas.openxmlformats.org/drawingml/2006/main" xmlns:r="http://schemas.openxmlformats.org/officeDocument/2006/relationships" xmlns:p="http://schemas.openxmlformats.org/presentationml/2006/main">
+  <p:cSld>
+    <p:spTree>
+      <p:nvGrpSpPr>
+        <p:cNvPr id="1" name=""/>
+        <p:cNvGrpSpPr/>
+        <p:nvPr/>
+      </p:nvGrpSpPr>
+      <p:grpSpPr>
+        <a:xfrm>
+          <a:off x="0" y="0"/>
+          <a:ext cx="0" cy="0"/>
+          <a:chOff x="0" y="0"/>
+          <a:chExt cx="0" cy="0"/>
+        </a:xfrm>
+      </p:grpSpPr>
+      <p:sp>
+        <p:nvSpPr>
+          <p:cNvPr id="2" name="Titel 1">
+            <a:extLst>
+              <a:ext uri="{FF2B5EF4-FFF2-40B4-BE49-F238E27FC236}">
+                <a16:creationId xmlns:a16="http://schemas.microsoft.com/office/drawing/2014/main" id="{3E3BBF3A-7A36-47EC-BA80-0E22AEB45CD5}"/>
+              </a:ext>
+            </a:extLst>
+          </p:cNvPr>
+          <p:cNvSpPr>
+            <a:spLocks noGrp="1"/>
+          </p:cNvSpPr>
+          <p:nvPr>
+            <p:ph type="title"/>
+          </p:nvPr>
+        </p:nvSpPr>
+        <p:spPr>
+          <a:xfrm>
+            <a:off x="4763280" y="-14613"/>
+            <a:ext cx="2509932" cy="1325563"/>
+          </a:xfrm>
+        </p:spPr>
+        <p:txBody>
+          <a:bodyPr/>
+          <a:lstStyle/>
+          <a:p>
+            <a:pPr algn="ctr"/>
+            <a:r>
+              <a:rPr lang="de-DE" b="1" dirty="0">
+                <a:effectLst>
+                  <a:outerShdw blurRad="38100" dist="38100" dir="2700000" algn="tl">
+                    <a:srgbClr val="000000">
+                      <a:alpha val="43137"/>
+                    </a:srgbClr>
+                  </a:outerShdw>
+                </a:effectLst>
+              </a:rPr>
+              <a:t>Über uns</a:t>
+            </a:r>
+          </a:p>
+        </p:txBody>
+      </p:sp>
+      <p:sp>
+        <p:nvSpPr>
+          <p:cNvPr id="7" name="Textfeld 6">
+            <a:extLst>
+              <a:ext uri="{FF2B5EF4-FFF2-40B4-BE49-F238E27FC236}">
+                <a16:creationId xmlns:a16="http://schemas.microsoft.com/office/drawing/2014/main" id="{631B2507-6676-4B83-95F9-4EE48EEA15A6}"/>
+              </a:ext>
+            </a:extLst>
+          </p:cNvPr>
+          <p:cNvSpPr txBox="1"/>
+          <p:nvPr/>
+        </p:nvSpPr>
+        <p:spPr>
+          <a:xfrm>
+            <a:off x="0" y="1437987"/>
+            <a:ext cx="5582816" cy="646331"/>
+          </a:xfrm>
+          <a:prstGeom prst="rect">
+            <a:avLst/>
+          </a:prstGeom>
+          <a:noFill/>
+        </p:spPr>
+        <p:txBody>
+          <a:bodyPr wrap="square" rtlCol="0">
+            <a:spAutoFit/>
+          </a:bodyPr>
+          <a:lstStyle/>
+          <a:p>
+            <a:pPr algn="ctr"/>
+            <a:r>
+              <a:rPr lang="de-DE" sz="3600" b="1" dirty="0"/>
+              <a:t>Rabea </a:t>
+            </a:r>
+            <a:r>
+              <a:rPr lang="de-DE" sz="3600" b="1" dirty="0" err="1"/>
+              <a:t>Kolsch</a:t>
+            </a:r>
+            <a:endParaRPr lang="de-DE" sz="3600" b="1" dirty="0"/>
+          </a:p>
+        </p:txBody>
+      </p:sp>
+      <p:sp>
+        <p:nvSpPr>
+          <p:cNvPr id="11" name="Textfeld 10">
+            <a:extLst>
+              <a:ext uri="{FF2B5EF4-FFF2-40B4-BE49-F238E27FC236}">
+                <a16:creationId xmlns:a16="http://schemas.microsoft.com/office/drawing/2014/main" id="{6DC73D47-F6A7-4F15-B463-690D5D9EF253}"/>
+              </a:ext>
+            </a:extLst>
+          </p:cNvPr>
+          <p:cNvSpPr txBox="1"/>
+          <p:nvPr/>
+        </p:nvSpPr>
+        <p:spPr>
+          <a:xfrm>
+            <a:off x="6096000" y="1499543"/>
+            <a:ext cx="5707224" cy="584775"/>
+          </a:xfrm>
+          <a:prstGeom prst="rect">
+            <a:avLst/>
+          </a:prstGeom>
+          <a:noFill/>
+        </p:spPr>
+        <p:txBody>
+          <a:bodyPr wrap="square" rtlCol="0">
+            <a:spAutoFit/>
+          </a:bodyPr>
+          <a:lstStyle/>
+          <a:p>
+            <a:pPr algn="ctr"/>
+            <a:r>
+              <a:rPr lang="de-DE" sz="3200" b="1" dirty="0"/>
+              <a:t>Mathis</a:t>
+            </a:r>
+            <a:r>
+              <a:rPr lang="de-DE" dirty="0"/>
+              <a:t> </a:t>
+            </a:r>
+            <a:r>
+              <a:rPr lang="de-DE" sz="3200" b="1" dirty="0" err="1"/>
+              <a:t>Gemke</a:t>
+            </a:r>
+            <a:endParaRPr lang="de-DE" sz="3200" b="1" dirty="0"/>
+          </a:p>
+        </p:txBody>
+      </p:sp>
+      <p:cxnSp>
+        <p:nvCxnSpPr>
+          <p:cNvPr id="13" name="Gerader Verbinder 12">
+            <a:extLst>
+              <a:ext uri="{FF2B5EF4-FFF2-40B4-BE49-F238E27FC236}">
+                <a16:creationId xmlns:a16="http://schemas.microsoft.com/office/drawing/2014/main" id="{43EE3D91-F9CA-4F35-BDAD-5C3026FA44E2}"/>
+              </a:ext>
+            </a:extLst>
+          </p:cNvPr>
+          <p:cNvCxnSpPr>
+            <a:cxnSpLocks/>
+          </p:cNvCxnSpPr>
+          <p:nvPr/>
+        </p:nvCxnSpPr>
+        <p:spPr>
+          <a:xfrm>
+            <a:off x="6018246" y="1343608"/>
+            <a:ext cx="0" cy="5514392"/>
+          </a:xfrm>
+          <a:prstGeom prst="line">
+            <a:avLst/>
+          </a:prstGeom>
+          <a:ln w="57150"/>
+        </p:spPr>
+        <p:style>
+          <a:lnRef idx="3">
+            <a:schemeClr val="dk1"/>
+          </a:lnRef>
+          <a:fillRef idx="0">
+            <a:schemeClr val="dk1"/>
+          </a:fillRef>
+          <a:effectRef idx="2">
+            <a:schemeClr val="dk1"/>
+          </a:effectRef>
+          <a:fontRef idx="minor">
+            <a:schemeClr val="tx1"/>
+          </a:fontRef>
+        </p:style>
+      </p:cxnSp>
+      <p:cxnSp>
+        <p:nvCxnSpPr>
+          <p:cNvPr id="17" name="Gerader Verbinder 16">
+            <a:extLst>
+              <a:ext uri="{FF2B5EF4-FFF2-40B4-BE49-F238E27FC236}">
+                <a16:creationId xmlns:a16="http://schemas.microsoft.com/office/drawing/2014/main" id="{4B59C556-D698-4EA0-A735-B429A0FC86C4}"/>
+              </a:ext>
+            </a:extLst>
+          </p:cNvPr>
+          <p:cNvCxnSpPr/>
+          <p:nvPr/>
+        </p:nvCxnSpPr>
+        <p:spPr>
+          <a:xfrm>
+            <a:off x="0" y="2174033"/>
+            <a:ext cx="12192000" cy="0"/>
+          </a:xfrm>
+          <a:prstGeom prst="line">
+            <a:avLst/>
+          </a:prstGeom>
+          <a:ln w="57150"/>
+        </p:spPr>
+        <p:style>
+          <a:lnRef idx="3">
+            <a:schemeClr val="dk1"/>
+          </a:lnRef>
+          <a:fillRef idx="0">
+            <a:schemeClr val="dk1"/>
+          </a:fillRef>
+          <a:effectRef idx="2">
+            <a:schemeClr val="dk1"/>
+          </a:effectRef>
+          <a:fontRef idx="minor">
+            <a:schemeClr val="tx1"/>
+          </a:fontRef>
+        </p:style>
+      </p:cxnSp>
+      <p:sp>
+        <p:nvSpPr>
+          <p:cNvPr id="20" name="Textfeld 19">
+            <a:extLst>
+              <a:ext uri="{FF2B5EF4-FFF2-40B4-BE49-F238E27FC236}">
+                <a16:creationId xmlns:a16="http://schemas.microsoft.com/office/drawing/2014/main" id="{95308803-82C6-4FA1-B885-09DF321A8E64}"/>
+              </a:ext>
+            </a:extLst>
+          </p:cNvPr>
+          <p:cNvSpPr txBox="1"/>
+          <p:nvPr/>
+        </p:nvSpPr>
+        <p:spPr>
+          <a:xfrm>
+            <a:off x="426104" y="2263749"/>
+            <a:ext cx="3446097" cy="4031873"/>
+          </a:xfrm>
+          <a:prstGeom prst="rect">
+            <a:avLst/>
+          </a:prstGeom>
+          <a:noFill/>
+        </p:spPr>
+        <p:txBody>
+          <a:bodyPr wrap="square" rtlCol="0">
+            <a:spAutoFit/>
+          </a:bodyPr>
+          <a:lstStyle/>
+          <a:p>
+            <a:pPr marL="285750" indent="-285750">
+              <a:buFont typeface="Symbol" panose="05050102010706020507" pitchFamily="18" charset="2"/>
+              <a:buChar char="-"/>
+            </a:pPr>
+            <a:r>
+              <a:rPr lang="de-DE" sz="3200" dirty="0"/>
+              <a:t>18 Jahre alt</a:t>
+            </a:r>
+          </a:p>
+          <a:p>
+            <a:pPr marL="285750" indent="-285750">
+              <a:buFont typeface="Symbol" panose="05050102010706020507" pitchFamily="18" charset="2"/>
+              <a:buChar char="-"/>
+            </a:pPr>
+            <a:r>
+              <a:rPr lang="de-DE" sz="3200" dirty="0"/>
+              <a:t>Mauritius Gymnasium Büren</a:t>
+            </a:r>
+          </a:p>
+          <a:p>
+            <a:pPr marL="285750" indent="-285750">
+              <a:buFont typeface="Symbol" panose="05050102010706020507" pitchFamily="18" charset="2"/>
+              <a:buChar char="-"/>
+            </a:pPr>
+            <a:r>
+              <a:rPr lang="de-DE" sz="3200" dirty="0"/>
+              <a:t>Jahrgangsstufe Q2</a:t>
+            </a:r>
+          </a:p>
+          <a:p>
+            <a:pPr marL="285750" indent="-285750">
+              <a:buFont typeface="Symbol" panose="05050102010706020507" pitchFamily="18" charset="2"/>
+              <a:buChar char="-"/>
+            </a:pPr>
+            <a:r>
+              <a:rPr lang="de-DE" sz="3200" dirty="0"/>
+              <a:t>rabea.kolsch@web.de</a:t>
+            </a:r>
+          </a:p>
+        </p:txBody>
+      </p:sp>
+      <p:sp>
+        <p:nvSpPr>
+          <p:cNvPr id="21" name="Textfeld 20">
+            <a:extLst>
+              <a:ext uri="{FF2B5EF4-FFF2-40B4-BE49-F238E27FC236}">
+                <a16:creationId xmlns:a16="http://schemas.microsoft.com/office/drawing/2014/main" id="{3355CBD3-3F98-4CCD-96A7-E8D6CF04C9D4}"/>
+              </a:ext>
+            </a:extLst>
+          </p:cNvPr>
+          <p:cNvSpPr txBox="1"/>
+          <p:nvPr/>
+        </p:nvSpPr>
+        <p:spPr>
+          <a:xfrm>
+            <a:off x="6326163" y="2263749"/>
+            <a:ext cx="3806886" cy="3970318"/>
+          </a:xfrm>
+          <a:prstGeom prst="rect">
+            <a:avLst/>
+          </a:prstGeom>
+          <a:noFill/>
+        </p:spPr>
+        <p:txBody>
+          <a:bodyPr wrap="square" rtlCol="0">
+            <a:spAutoFit/>
+          </a:bodyPr>
+          <a:lstStyle/>
+          <a:p>
+            <a:pPr marL="285750" indent="-285750">
+              <a:buFont typeface="Symbol" panose="05050102010706020507" pitchFamily="18" charset="2"/>
+              <a:buChar char="-"/>
+            </a:pPr>
+            <a:r>
+              <a:rPr lang="de-DE" sz="3600" dirty="0"/>
+              <a:t>14 Jahre alt</a:t>
+            </a:r>
+          </a:p>
+          <a:p>
+            <a:pPr marL="285750" indent="-285750">
+              <a:buFont typeface="Symbol" panose="05050102010706020507" pitchFamily="18" charset="2"/>
+              <a:buChar char="-"/>
+            </a:pPr>
+            <a:r>
+              <a:rPr lang="de-DE" sz="3600" dirty="0"/>
+              <a:t>Realschule </a:t>
+            </a:r>
+            <a:r>
+              <a:rPr lang="de-DE" sz="3600" dirty="0" err="1"/>
+              <a:t>St.Michael</a:t>
+            </a:r>
+            <a:r>
+              <a:rPr lang="de-DE" sz="3600" dirty="0"/>
+              <a:t> Paderborn</a:t>
+            </a:r>
+          </a:p>
+          <a:p>
+            <a:pPr marL="285750" indent="-285750">
+              <a:buFont typeface="Symbol" panose="05050102010706020507" pitchFamily="18" charset="2"/>
+              <a:buChar char="-"/>
+            </a:pPr>
+            <a:r>
+              <a:rPr lang="de-DE" sz="3600" dirty="0"/>
+              <a:t>Jahrgangsstufe 9</a:t>
+            </a:r>
+          </a:p>
+          <a:p>
+            <a:pPr marL="285750" indent="-285750">
+              <a:buFont typeface="Symbol" panose="05050102010706020507" pitchFamily="18" charset="2"/>
+              <a:buChar char="-"/>
+            </a:pPr>
+            <a:r>
+              <a:rPr lang="de-DE" sz="3600" dirty="0"/>
+              <a:t>Mathis.gemke@gmail.com</a:t>
+            </a:r>
+          </a:p>
+        </p:txBody>
+      </p:sp>
+    </p:spTree>
+    <p:extLst>
+      <p:ext uri="{BB962C8B-B14F-4D97-AF65-F5344CB8AC3E}">
+        <p14:creationId xmlns:p14="http://schemas.microsoft.com/office/powerpoint/2010/main" val="1156430821"/>
+      </p:ext>
+    </p:extLst>
+  </p:cSld>
+  <p:clrMapOvr>
+    <a:masterClrMapping/>
+  </p:clrMapOvr>
+</p:sld>
+</file>
+
+<file path=ppt/slides/slide3.xml><?xml version="1.0" encoding="utf-8"?>
 <p:sld xmlns:a="http://schemas.openxmlformats.org/drawingml/2006/main" xmlns:r="http://schemas.openxmlformats.org/officeDocument/2006/relationships" xmlns:p="http://schemas.openxmlformats.org/presentationml/2006/main">
   <p:cSld>
     <p:bg>
@@ -3822,7 +4603,7 @@
 </p:sld>
 </file>
 
-<file path=ppt/slides/slide3.xml><?xml version="1.0" encoding="utf-8"?>
+<file path=ppt/slides/slide4.xml><?xml version="1.0" encoding="utf-8"?>
 <p:sld xmlns:a="http://schemas.openxmlformats.org/drawingml/2006/main" xmlns:r="http://schemas.openxmlformats.org/officeDocument/2006/relationships" xmlns:p="http://schemas.openxmlformats.org/presentationml/2006/main">
   <p:cSld>
     <p:bg>
@@ -4220,7 +5001,7 @@
         </p:nvCxnSpPr>
         <p:spPr>
           <a:xfrm>
-            <a:off x="9695501" y="3124966"/>
+            <a:off x="9694416" y="3339570"/>
             <a:ext cx="0" cy="1304159"/>
           </a:xfrm>
           <a:prstGeom prst="straightConnector1">
@@ -4356,9 +5137,17 @@
 </p:sld>
 </file>
 
-<file path=ppt/slides/slide4.xml><?xml version="1.0" encoding="utf-8"?>
+<file path=ppt/slides/slide5.xml><?xml version="1.0" encoding="utf-8"?>
 <p:sld xmlns:a="http://schemas.openxmlformats.org/drawingml/2006/main" xmlns:r="http://schemas.openxmlformats.org/officeDocument/2006/relationships" xmlns:p="http://schemas.openxmlformats.org/presentationml/2006/main">
   <p:cSld>
+    <p:bg>
+      <p:bgPr>
+        <a:solidFill>
+          <a:schemeClr val="bg2"/>
+        </a:solidFill>
+        <a:effectLst/>
+      </p:bgPr>
+    </p:bg>
     <p:spTree>
       <p:nvGrpSpPr>
         <p:cNvPr id="1" name=""/>
@@ -4856,6 +5645,55 @@
           </a:p>
         </p:txBody>
       </p:sp>
+      <p:sp>
+        <p:nvSpPr>
+          <p:cNvPr id="2" name="Textfeld 1">
+            <a:extLst>
+              <a:ext uri="{FF2B5EF4-FFF2-40B4-BE49-F238E27FC236}">
+                <a16:creationId xmlns:a16="http://schemas.microsoft.com/office/drawing/2014/main" id="{99B44706-D2B4-4C8C-8F6C-5F001808A77E}"/>
+              </a:ext>
+            </a:extLst>
+          </p:cNvPr>
+          <p:cNvSpPr txBox="1"/>
+          <p:nvPr/>
+        </p:nvSpPr>
+        <p:spPr>
+          <a:xfrm>
+            <a:off x="429208" y="4889341"/>
+            <a:ext cx="4915149" cy="923330"/>
+          </a:xfrm>
+          <a:prstGeom prst="rect">
+            <a:avLst/>
+          </a:prstGeom>
+          <a:noFill/>
+        </p:spPr>
+        <p:txBody>
+          <a:bodyPr wrap="square" rtlCol="0">
+            <a:spAutoFit/>
+          </a:bodyPr>
+          <a:lstStyle/>
+          <a:p>
+            <a:pPr algn="ctr"/>
+            <a:r>
+              <a:rPr lang="de-DE" sz="5400" b="1" dirty="0">
+                <a:solidFill>
+                  <a:schemeClr val="accent1">
+                    <a:lumMod val="75000"/>
+                  </a:schemeClr>
+                </a:solidFill>
+                <a:effectLst>
+                  <a:outerShdw blurRad="38100" dist="38100" dir="2700000" algn="tl">
+                    <a:srgbClr val="000000">
+                      <a:alpha val="43137"/>
+                    </a:srgbClr>
+                  </a:outerShdw>
+                </a:effectLst>
+              </a:rPr>
+              <a:t>Lösung</a:t>
+            </a:r>
+          </a:p>
+        </p:txBody>
+      </p:sp>
     </p:spTree>
     <p:extLst>
       <p:ext uri="{BB962C8B-B14F-4D97-AF65-F5344CB8AC3E}">
@@ -4870,6 +5708,301 @@
 </file>
 
 <file path=ppt/theme/theme1.xml><?xml version="1.0" encoding="utf-8"?>
+<a:theme xmlns:a="http://schemas.openxmlformats.org/drawingml/2006/main" name="Office">
+  <a:themeElements>
+    <a:clrScheme name="Warmes Blau">
+      <a:dk1>
+        <a:sysClr val="windowText" lastClr="000000"/>
+      </a:dk1>
+      <a:lt1>
+        <a:sysClr val="window" lastClr="FFFFFF"/>
+      </a:lt1>
+      <a:dk2>
+        <a:srgbClr val="242852"/>
+      </a:dk2>
+      <a:lt2>
+        <a:srgbClr val="ACCBF9"/>
+      </a:lt2>
+      <a:accent1>
+        <a:srgbClr val="4A66AC"/>
+      </a:accent1>
+      <a:accent2>
+        <a:srgbClr val="629DD1"/>
+      </a:accent2>
+      <a:accent3>
+        <a:srgbClr val="297FD5"/>
+      </a:accent3>
+      <a:accent4>
+        <a:srgbClr val="7F8FA9"/>
+      </a:accent4>
+      <a:accent5>
+        <a:srgbClr val="5AA2AE"/>
+      </a:accent5>
+      <a:accent6>
+        <a:srgbClr val="9D90A0"/>
+      </a:accent6>
+      <a:hlink>
+        <a:srgbClr val="9454C3"/>
+      </a:hlink>
+      <a:folHlink>
+        <a:srgbClr val="3EBBF0"/>
+      </a:folHlink>
+    </a:clrScheme>
+    <a:fontScheme name="Office">
+      <a:majorFont>
+        <a:latin typeface="Calibri Light" panose="020F0302020204030204"/>
+        <a:ea typeface=""/>
+        <a:cs typeface=""/>
+        <a:font script="Jpan" typeface="游ゴシック Light"/>
+        <a:font script="Hang" typeface="맑은 고딕"/>
+        <a:font script="Hans" typeface="等线 Light"/>
+        <a:font script="Hant" typeface="新細明體"/>
+        <a:font script="Arab" typeface="Times New Roman"/>
+        <a:font script="Hebr" typeface="Times New Roman"/>
+        <a:font script="Thai" typeface="Angsana New"/>
+        <a:font script="Ethi" typeface="Nyala"/>
+        <a:font script="Beng" typeface="Vrinda"/>
+        <a:font script="Gujr" typeface="Shruti"/>
+        <a:font script="Khmr" typeface="MoolBoran"/>
+        <a:font script="Knda" typeface="Tunga"/>
+        <a:font script="Guru" typeface="Raavi"/>
+        <a:font script="Cans" typeface="Euphemia"/>
+        <a:font script="Cher" typeface="Plantagenet Cherokee"/>
+        <a:font script="Yiii" typeface="Microsoft Yi Baiti"/>
+        <a:font script="Tibt" typeface="Microsoft Himalaya"/>
+        <a:font script="Thaa" typeface="MV Boli"/>
+        <a:font script="Deva" typeface="Mangal"/>
+        <a:font script="Telu" typeface="Gautami"/>
+        <a:font script="Taml" typeface="Latha"/>
+        <a:font script="Syrc" typeface="Estrangelo Edessa"/>
+        <a:font script="Orya" typeface="Kalinga"/>
+        <a:font script="Mlym" typeface="Kartika"/>
+        <a:font script="Laoo" typeface="DokChampa"/>
+        <a:font script="Sinh" typeface="Iskoola Pota"/>
+        <a:font script="Mong" typeface="Mongolian Baiti"/>
+        <a:font script="Viet" typeface="Times New Roman"/>
+        <a:font script="Uigh" typeface="Microsoft Uighur"/>
+        <a:font script="Geor" typeface="Sylfaen"/>
+        <a:font script="Armn" typeface="Arial"/>
+        <a:font script="Bugi" typeface="Leelawadee UI"/>
+        <a:font script="Bopo" typeface="Microsoft JhengHei"/>
+        <a:font script="Java" typeface="Javanese Text"/>
+        <a:font script="Lisu" typeface="Segoe UI"/>
+        <a:font script="Mymr" typeface="Myanmar Text"/>
+        <a:font script="Nkoo" typeface="Ebrima"/>
+        <a:font script="Olck" typeface="Nirmala UI"/>
+        <a:font script="Osma" typeface="Ebrima"/>
+        <a:font script="Phag" typeface="Phagspa"/>
+        <a:font script="Syrn" typeface="Estrangelo Edessa"/>
+        <a:font script="Syrj" typeface="Estrangelo Edessa"/>
+        <a:font script="Syre" typeface="Estrangelo Edessa"/>
+        <a:font script="Sora" typeface="Nirmala UI"/>
+        <a:font script="Tale" typeface="Microsoft Tai Le"/>
+        <a:font script="Talu" typeface="Microsoft New Tai Lue"/>
+        <a:font script="Tfng" typeface="Ebrima"/>
+      </a:majorFont>
+      <a:minorFont>
+        <a:latin typeface="Calibri" panose="020F0502020204030204"/>
+        <a:ea typeface=""/>
+        <a:cs typeface=""/>
+        <a:font script="Jpan" typeface="游ゴシック"/>
+        <a:font script="Hang" typeface="맑은 고딕"/>
+        <a:font script="Hans" typeface="等线"/>
+        <a:font script="Hant" typeface="新細明體"/>
+        <a:font script="Arab" typeface="Arial"/>
+        <a:font script="Hebr" typeface="Arial"/>
+        <a:font script="Thai" typeface="Cordia New"/>
+        <a:font script="Ethi" typeface="Nyala"/>
+        <a:font script="Beng" typeface="Vrinda"/>
+        <a:font script="Gujr" typeface="Shruti"/>
+        <a:font script="Khmr" typeface="DaunPenh"/>
+        <a:font script="Knda" typeface="Tunga"/>
+        <a:font script="Guru" typeface="Raavi"/>
+        <a:font script="Cans" typeface="Euphemia"/>
+        <a:font script="Cher" typeface="Plantagenet Cherokee"/>
+        <a:font script="Yiii" typeface="Microsoft Yi Baiti"/>
+        <a:font script="Tibt" typeface="Microsoft Himalaya"/>
+        <a:font script="Thaa" typeface="MV Boli"/>
+        <a:font script="Deva" typeface="Mangal"/>
+        <a:font script="Telu" typeface="Gautami"/>
+        <a:font script="Taml" typeface="Latha"/>
+        <a:font script="Syrc" typeface="Estrangelo Edessa"/>
+        <a:font script="Orya" typeface="Kalinga"/>
+        <a:font script="Mlym" typeface="Kartika"/>
+        <a:font script="Laoo" typeface="DokChampa"/>
+        <a:font script="Sinh" typeface="Iskoola Pota"/>
+        <a:font script="Mong" typeface="Mongolian Baiti"/>
+        <a:font script="Viet" typeface="Arial"/>
+        <a:font script="Uigh" typeface="Microsoft Uighur"/>
+        <a:font script="Geor" typeface="Sylfaen"/>
+        <a:font script="Armn" typeface="Arial"/>
+        <a:font script="Bugi" typeface="Leelawadee UI"/>
+        <a:font script="Bopo" typeface="Microsoft JhengHei"/>
+        <a:font script="Java" typeface="Javanese Text"/>
+        <a:font script="Lisu" typeface="Segoe UI"/>
+        <a:font script="Mymr" typeface="Myanmar Text"/>
+        <a:font script="Nkoo" typeface="Ebrima"/>
+        <a:font script="Olck" typeface="Nirmala UI"/>
+        <a:font script="Osma" typeface="Ebrima"/>
+        <a:font script="Phag" typeface="Phagspa"/>
+        <a:font script="Syrn" typeface="Estrangelo Edessa"/>
+        <a:font script="Syrj" typeface="Estrangelo Edessa"/>
+        <a:font script="Syre" typeface="Estrangelo Edessa"/>
+        <a:font script="Sora" typeface="Nirmala UI"/>
+        <a:font script="Tale" typeface="Microsoft Tai Le"/>
+        <a:font script="Talu" typeface="Microsoft New Tai Lue"/>
+        <a:font script="Tfng" typeface="Ebrima"/>
+      </a:minorFont>
+    </a:fontScheme>
+    <a:fmtScheme name="Office">
+      <a:fillStyleLst>
+        <a:solidFill>
+          <a:schemeClr val="phClr"/>
+        </a:solidFill>
+        <a:gradFill rotWithShape="1">
+          <a:gsLst>
+            <a:gs pos="0">
+              <a:schemeClr val="phClr">
+                <a:lumMod val="110000"/>
+                <a:satMod val="105000"/>
+                <a:tint val="67000"/>
+              </a:schemeClr>
+            </a:gs>
+            <a:gs pos="50000">
+              <a:schemeClr val="phClr">
+                <a:lumMod val="105000"/>
+                <a:satMod val="103000"/>
+                <a:tint val="73000"/>
+              </a:schemeClr>
+            </a:gs>
+            <a:gs pos="100000">
+              <a:schemeClr val="phClr">
+                <a:lumMod val="105000"/>
+                <a:satMod val="109000"/>
+                <a:tint val="81000"/>
+              </a:schemeClr>
+            </a:gs>
+          </a:gsLst>
+          <a:lin ang="5400000" scaled="0"/>
+        </a:gradFill>
+        <a:gradFill rotWithShape="1">
+          <a:gsLst>
+            <a:gs pos="0">
+              <a:schemeClr val="phClr">
+                <a:satMod val="103000"/>
+                <a:lumMod val="102000"/>
+                <a:tint val="94000"/>
+              </a:schemeClr>
+            </a:gs>
+            <a:gs pos="50000">
+              <a:schemeClr val="phClr">
+                <a:satMod val="110000"/>
+                <a:lumMod val="100000"/>
+                <a:shade val="100000"/>
+              </a:schemeClr>
+            </a:gs>
+            <a:gs pos="100000">
+              <a:schemeClr val="phClr">
+                <a:lumMod val="99000"/>
+                <a:satMod val="120000"/>
+                <a:shade val="78000"/>
+              </a:schemeClr>
+            </a:gs>
+          </a:gsLst>
+          <a:lin ang="5400000" scaled="0"/>
+        </a:gradFill>
+      </a:fillStyleLst>
+      <a:lnStyleLst>
+        <a:ln w="6350" cap="flat" cmpd="sng" algn="ctr">
+          <a:solidFill>
+            <a:schemeClr val="phClr"/>
+          </a:solidFill>
+          <a:prstDash val="solid"/>
+          <a:miter lim="800000"/>
+        </a:ln>
+        <a:ln w="12700" cap="flat" cmpd="sng" algn="ctr">
+          <a:solidFill>
+            <a:schemeClr val="phClr"/>
+          </a:solidFill>
+          <a:prstDash val="solid"/>
+          <a:miter lim="800000"/>
+        </a:ln>
+        <a:ln w="19050" cap="flat" cmpd="sng" algn="ctr">
+          <a:solidFill>
+            <a:schemeClr val="phClr"/>
+          </a:solidFill>
+          <a:prstDash val="solid"/>
+          <a:miter lim="800000"/>
+        </a:ln>
+      </a:lnStyleLst>
+      <a:effectStyleLst>
+        <a:effectStyle>
+          <a:effectLst/>
+        </a:effectStyle>
+        <a:effectStyle>
+          <a:effectLst/>
+        </a:effectStyle>
+        <a:effectStyle>
+          <a:effectLst>
+            <a:outerShdw blurRad="57150" dist="19050" dir="5400000" algn="ctr" rotWithShape="0">
+              <a:srgbClr val="000000">
+                <a:alpha val="63000"/>
+              </a:srgbClr>
+            </a:outerShdw>
+          </a:effectLst>
+        </a:effectStyle>
+      </a:effectStyleLst>
+      <a:bgFillStyleLst>
+        <a:solidFill>
+          <a:schemeClr val="phClr"/>
+        </a:solidFill>
+        <a:solidFill>
+          <a:schemeClr val="phClr">
+            <a:tint val="95000"/>
+            <a:satMod val="170000"/>
+          </a:schemeClr>
+        </a:solidFill>
+        <a:gradFill rotWithShape="1">
+          <a:gsLst>
+            <a:gs pos="0">
+              <a:schemeClr val="phClr">
+                <a:tint val="93000"/>
+                <a:satMod val="150000"/>
+                <a:shade val="98000"/>
+                <a:lumMod val="102000"/>
+              </a:schemeClr>
+            </a:gs>
+            <a:gs pos="50000">
+              <a:schemeClr val="phClr">
+                <a:tint val="98000"/>
+                <a:satMod val="130000"/>
+                <a:shade val="90000"/>
+                <a:lumMod val="103000"/>
+              </a:schemeClr>
+            </a:gs>
+            <a:gs pos="100000">
+              <a:schemeClr val="phClr">
+                <a:shade val="63000"/>
+                <a:satMod val="120000"/>
+              </a:schemeClr>
+            </a:gs>
+          </a:gsLst>
+          <a:lin ang="5400000" scaled="0"/>
+        </a:gradFill>
+      </a:bgFillStyleLst>
+    </a:fmtScheme>
+  </a:themeElements>
+  <a:objectDefaults/>
+  <a:extraClrSchemeLst/>
+  <a:extLst>
+    <a:ext uri="{05A4C25C-085E-4340-85A3-A5531E510DB2}">
+      <thm15:themeFamily xmlns:thm15="http://schemas.microsoft.com/office/thememl/2012/main" name="Office Theme" id="{62F939B6-93AF-4DB8-9C6B-D6C7DFDC589F}" vid="{4A3C46E8-61CC-4603-A589-7422A47A8E4A}"/>
+    </a:ext>
+  </a:extLst>
+</a:theme>
+</file>
+
+<file path=ppt/theme/theme2.xml><?xml version="1.0" encoding="utf-8"?>
 <a:theme xmlns:a="http://schemas.openxmlformats.org/drawingml/2006/main" name="Office">
   <a:themeElements>
     <a:clrScheme name="Office">

</xml_diff>

<commit_message>
eventuell wahrscheinlich zu 99% fertige  Version
</commit_message>
<xml_diff>
--- a/Powerpoint.pptx
+++ b/Powerpoint.pptx
@@ -5,13 +5,15 @@
     <p:sldMasterId id="2147483675" r:id="rId1"/>
   </p:sldMasterIdLst>
   <p:notesMasterIdLst>
-    <p:notesMasterId r:id="rId6"/>
+    <p:notesMasterId r:id="rId8"/>
   </p:notesMasterIdLst>
   <p:sldIdLst>
     <p:sldId id="256" r:id="rId2"/>
     <p:sldId id="257" r:id="rId3"/>
     <p:sldId id="258" r:id="rId4"/>
     <p:sldId id="259" r:id="rId5"/>
+    <p:sldId id="261" r:id="rId6"/>
+    <p:sldId id="260" r:id="rId7"/>
   </p:sldIdLst>
   <p:sldSz cx="12192000" cy="6858000"/>
   <p:notesSz cx="6858000" cy="9144000"/>
@@ -112,7 +114,18 @@
   </p:defaultTextStyle>
   <p:extLst>
     <p:ext uri="{EFAFB233-063F-42B5-8137-9DF3F51BA10A}">
-      <p15:sldGuideLst xmlns:p15="http://schemas.microsoft.com/office/powerpoint/2012/main" xmlns=""/>
+      <p15:sldGuideLst xmlns:p15="http://schemas.microsoft.com/office/powerpoint/2012/main">
+        <p15:guide id="1" orient="horz" pos="2160">
+          <p15:clr>
+            <a:srgbClr val="A4A3A4"/>
+          </p15:clr>
+        </p15:guide>
+        <p15:guide id="2" pos="3840">
+          <p15:clr>
+            <a:srgbClr val="A4A3A4"/>
+          </p15:clr>
+        </p15:guide>
+      </p15:sldGuideLst>
     </p:ext>
   </p:extLst>
 </p:presentation>
@@ -489,7 +502,7 @@
           <p:cNvPr id="2" name="Titel 1">
             <a:extLst>
               <a:ext uri="{FF2B5EF4-FFF2-40B4-BE49-F238E27FC236}">
-                <a16:creationId xmlns:a16="http://schemas.microsoft.com/office/drawing/2014/main" xmlns="" id="{2D99FB4D-73A5-4B63-89D4-359821D52D79}"/>
+                <a16:creationId xmlns:a16="http://schemas.microsoft.com/office/drawing/2014/main" id="{2D99FB4D-73A5-4B63-89D4-359821D52D79}"/>
               </a:ext>
             </a:extLst>
           </p:cNvPr>
@@ -526,7 +539,7 @@
           <p:cNvPr id="3" name="Untertitel 2">
             <a:extLst>
               <a:ext uri="{FF2B5EF4-FFF2-40B4-BE49-F238E27FC236}">
-                <a16:creationId xmlns:a16="http://schemas.microsoft.com/office/drawing/2014/main" xmlns="" id="{B1583B13-C318-4E17-B8A2-0FBDAA37B8B8}"/>
+                <a16:creationId xmlns:a16="http://schemas.microsoft.com/office/drawing/2014/main" id="{B1583B13-C318-4E17-B8A2-0FBDAA37B8B8}"/>
               </a:ext>
             </a:extLst>
           </p:cNvPr>
@@ -596,7 +609,7 @@
           <p:cNvPr id="4" name="Datumsplatzhalter 3">
             <a:extLst>
               <a:ext uri="{FF2B5EF4-FFF2-40B4-BE49-F238E27FC236}">
-                <a16:creationId xmlns:a16="http://schemas.microsoft.com/office/drawing/2014/main" xmlns="" id="{AE5A30E1-EE15-4320-8FFB-50872DF3FBCB}"/>
+                <a16:creationId xmlns:a16="http://schemas.microsoft.com/office/drawing/2014/main" id="{AE5A30E1-EE15-4320-8FFB-50872DF3FBCB}"/>
               </a:ext>
             </a:extLst>
           </p:cNvPr>
@@ -625,7 +638,7 @@
           <p:cNvPr id="5" name="Fußzeilenplatzhalter 4">
             <a:extLst>
               <a:ext uri="{FF2B5EF4-FFF2-40B4-BE49-F238E27FC236}">
-                <a16:creationId xmlns:a16="http://schemas.microsoft.com/office/drawing/2014/main" xmlns="" id="{8A19DA4F-18C3-47ED-81BF-F79D0A76ACC1}"/>
+                <a16:creationId xmlns:a16="http://schemas.microsoft.com/office/drawing/2014/main" id="{8A19DA4F-18C3-47ED-81BF-F79D0A76ACC1}"/>
               </a:ext>
             </a:extLst>
           </p:cNvPr>
@@ -650,7 +663,7 @@
           <p:cNvPr id="6" name="Foliennummernplatzhalter 5">
             <a:extLst>
               <a:ext uri="{FF2B5EF4-FFF2-40B4-BE49-F238E27FC236}">
-                <a16:creationId xmlns:a16="http://schemas.microsoft.com/office/drawing/2014/main" xmlns="" id="{D77174A7-738D-41E9-AC16-1D3EC9BAA22D}"/>
+                <a16:creationId xmlns:a16="http://schemas.microsoft.com/office/drawing/2014/main" id="{D77174A7-738D-41E9-AC16-1D3EC9BAA22D}"/>
               </a:ext>
             </a:extLst>
           </p:cNvPr>
@@ -709,7 +722,7 @@
           <p:cNvPr id="2" name="Titel 1">
             <a:extLst>
               <a:ext uri="{FF2B5EF4-FFF2-40B4-BE49-F238E27FC236}">
-                <a16:creationId xmlns:a16="http://schemas.microsoft.com/office/drawing/2014/main" xmlns="" id="{05F16755-CA5A-4967-AA95-4F98F3B37D09}"/>
+                <a16:creationId xmlns:a16="http://schemas.microsoft.com/office/drawing/2014/main" id="{05F16755-CA5A-4967-AA95-4F98F3B37D09}"/>
               </a:ext>
             </a:extLst>
           </p:cNvPr>
@@ -737,7 +750,7 @@
           <p:cNvPr id="3" name="Vertikaler Textplatzhalter 2">
             <a:extLst>
               <a:ext uri="{FF2B5EF4-FFF2-40B4-BE49-F238E27FC236}">
-                <a16:creationId xmlns:a16="http://schemas.microsoft.com/office/drawing/2014/main" xmlns="" id="{0722230E-F6AB-471C-9746-6BF2E3D99FED}"/>
+                <a16:creationId xmlns:a16="http://schemas.microsoft.com/office/drawing/2014/main" id="{0722230E-F6AB-471C-9746-6BF2E3D99FED}"/>
               </a:ext>
             </a:extLst>
           </p:cNvPr>
@@ -794,7 +807,7 @@
           <p:cNvPr id="4" name="Datumsplatzhalter 3">
             <a:extLst>
               <a:ext uri="{FF2B5EF4-FFF2-40B4-BE49-F238E27FC236}">
-                <a16:creationId xmlns:a16="http://schemas.microsoft.com/office/drawing/2014/main" xmlns="" id="{C8033B40-24EA-4AD8-B492-41004EA573E3}"/>
+                <a16:creationId xmlns:a16="http://schemas.microsoft.com/office/drawing/2014/main" id="{C8033B40-24EA-4AD8-B492-41004EA573E3}"/>
               </a:ext>
             </a:extLst>
           </p:cNvPr>
@@ -823,7 +836,7 @@
           <p:cNvPr id="5" name="Fußzeilenplatzhalter 4">
             <a:extLst>
               <a:ext uri="{FF2B5EF4-FFF2-40B4-BE49-F238E27FC236}">
-                <a16:creationId xmlns:a16="http://schemas.microsoft.com/office/drawing/2014/main" xmlns="" id="{3D6EA412-3E83-402F-89D2-998194593673}"/>
+                <a16:creationId xmlns:a16="http://schemas.microsoft.com/office/drawing/2014/main" id="{3D6EA412-3E83-402F-89D2-998194593673}"/>
               </a:ext>
             </a:extLst>
           </p:cNvPr>
@@ -848,7 +861,7 @@
           <p:cNvPr id="6" name="Foliennummernplatzhalter 5">
             <a:extLst>
               <a:ext uri="{FF2B5EF4-FFF2-40B4-BE49-F238E27FC236}">
-                <a16:creationId xmlns:a16="http://schemas.microsoft.com/office/drawing/2014/main" xmlns="" id="{981919F5-ABEE-4391-9BAF-020F69B47C54}"/>
+                <a16:creationId xmlns:a16="http://schemas.microsoft.com/office/drawing/2014/main" id="{981919F5-ABEE-4391-9BAF-020F69B47C54}"/>
               </a:ext>
             </a:extLst>
           </p:cNvPr>
@@ -907,7 +920,7 @@
           <p:cNvPr id="2" name="Vertikaler Titel 1">
             <a:extLst>
               <a:ext uri="{FF2B5EF4-FFF2-40B4-BE49-F238E27FC236}">
-                <a16:creationId xmlns:a16="http://schemas.microsoft.com/office/drawing/2014/main" xmlns="" id="{EE6F5B4C-D804-4EEF-BA9D-3AE56E6A44EA}"/>
+                <a16:creationId xmlns:a16="http://schemas.microsoft.com/office/drawing/2014/main" id="{EE6F5B4C-D804-4EEF-BA9D-3AE56E6A44EA}"/>
               </a:ext>
             </a:extLst>
           </p:cNvPr>
@@ -940,7 +953,7 @@
           <p:cNvPr id="3" name="Vertikaler Textplatzhalter 2">
             <a:extLst>
               <a:ext uri="{FF2B5EF4-FFF2-40B4-BE49-F238E27FC236}">
-                <a16:creationId xmlns:a16="http://schemas.microsoft.com/office/drawing/2014/main" xmlns="" id="{0DC6E000-4A80-4646-A603-62FEC43578E5}"/>
+                <a16:creationId xmlns:a16="http://schemas.microsoft.com/office/drawing/2014/main" id="{0DC6E000-4A80-4646-A603-62FEC43578E5}"/>
               </a:ext>
             </a:extLst>
           </p:cNvPr>
@@ -1002,7 +1015,7 @@
           <p:cNvPr id="4" name="Datumsplatzhalter 3">
             <a:extLst>
               <a:ext uri="{FF2B5EF4-FFF2-40B4-BE49-F238E27FC236}">
-                <a16:creationId xmlns:a16="http://schemas.microsoft.com/office/drawing/2014/main" xmlns="" id="{5FF9DE78-1D0C-4FEE-A535-6756A1ABA760}"/>
+                <a16:creationId xmlns:a16="http://schemas.microsoft.com/office/drawing/2014/main" id="{5FF9DE78-1D0C-4FEE-A535-6756A1ABA760}"/>
               </a:ext>
             </a:extLst>
           </p:cNvPr>
@@ -1031,7 +1044,7 @@
           <p:cNvPr id="5" name="Fußzeilenplatzhalter 4">
             <a:extLst>
               <a:ext uri="{FF2B5EF4-FFF2-40B4-BE49-F238E27FC236}">
-                <a16:creationId xmlns:a16="http://schemas.microsoft.com/office/drawing/2014/main" xmlns="" id="{7567CBC3-5D58-4299-BFEE-16B37ABD2E39}"/>
+                <a16:creationId xmlns:a16="http://schemas.microsoft.com/office/drawing/2014/main" id="{7567CBC3-5D58-4299-BFEE-16B37ABD2E39}"/>
               </a:ext>
             </a:extLst>
           </p:cNvPr>
@@ -1056,7 +1069,7 @@
           <p:cNvPr id="6" name="Foliennummernplatzhalter 5">
             <a:extLst>
               <a:ext uri="{FF2B5EF4-FFF2-40B4-BE49-F238E27FC236}">
-                <a16:creationId xmlns:a16="http://schemas.microsoft.com/office/drawing/2014/main" xmlns="" id="{1CCBAF69-470D-4CC0-B3B9-356A1FF088CB}"/>
+                <a16:creationId xmlns:a16="http://schemas.microsoft.com/office/drawing/2014/main" id="{1CCBAF69-470D-4CC0-B3B9-356A1FF088CB}"/>
               </a:ext>
             </a:extLst>
           </p:cNvPr>
@@ -1115,7 +1128,7 @@
           <p:cNvPr id="2" name="Titel 1">
             <a:extLst>
               <a:ext uri="{FF2B5EF4-FFF2-40B4-BE49-F238E27FC236}">
-                <a16:creationId xmlns:a16="http://schemas.microsoft.com/office/drawing/2014/main" xmlns="" id="{B5F5546E-2379-49CF-B2FE-10863C3FC848}"/>
+                <a16:creationId xmlns:a16="http://schemas.microsoft.com/office/drawing/2014/main" id="{B5F5546E-2379-49CF-B2FE-10863C3FC848}"/>
               </a:ext>
             </a:extLst>
           </p:cNvPr>
@@ -1143,7 +1156,7 @@
           <p:cNvPr id="3" name="Inhaltsplatzhalter 2">
             <a:extLst>
               <a:ext uri="{FF2B5EF4-FFF2-40B4-BE49-F238E27FC236}">
-                <a16:creationId xmlns:a16="http://schemas.microsoft.com/office/drawing/2014/main" xmlns="" id="{FC500CAB-CEB7-4C44-9C3C-D8F4F157F9D4}"/>
+                <a16:creationId xmlns:a16="http://schemas.microsoft.com/office/drawing/2014/main" id="{FC500CAB-CEB7-4C44-9C3C-D8F4F157F9D4}"/>
               </a:ext>
             </a:extLst>
           </p:cNvPr>
@@ -1200,7 +1213,7 @@
           <p:cNvPr id="4" name="Datumsplatzhalter 3">
             <a:extLst>
               <a:ext uri="{FF2B5EF4-FFF2-40B4-BE49-F238E27FC236}">
-                <a16:creationId xmlns:a16="http://schemas.microsoft.com/office/drawing/2014/main" xmlns="" id="{3B2D0E30-E3AB-4773-AAC7-D74DB611FF9C}"/>
+                <a16:creationId xmlns:a16="http://schemas.microsoft.com/office/drawing/2014/main" id="{3B2D0E30-E3AB-4773-AAC7-D74DB611FF9C}"/>
               </a:ext>
             </a:extLst>
           </p:cNvPr>
@@ -1229,7 +1242,7 @@
           <p:cNvPr id="5" name="Fußzeilenplatzhalter 4">
             <a:extLst>
               <a:ext uri="{FF2B5EF4-FFF2-40B4-BE49-F238E27FC236}">
-                <a16:creationId xmlns:a16="http://schemas.microsoft.com/office/drawing/2014/main" xmlns="" id="{8B16398F-7569-4F79-B417-231EBFCDF633}"/>
+                <a16:creationId xmlns:a16="http://schemas.microsoft.com/office/drawing/2014/main" id="{8B16398F-7569-4F79-B417-231EBFCDF633}"/>
               </a:ext>
             </a:extLst>
           </p:cNvPr>
@@ -1254,7 +1267,7 @@
           <p:cNvPr id="6" name="Foliennummernplatzhalter 5">
             <a:extLst>
               <a:ext uri="{FF2B5EF4-FFF2-40B4-BE49-F238E27FC236}">
-                <a16:creationId xmlns:a16="http://schemas.microsoft.com/office/drawing/2014/main" xmlns="" id="{00833AB8-2C1A-442B-A97F-0809079822E2}"/>
+                <a16:creationId xmlns:a16="http://schemas.microsoft.com/office/drawing/2014/main" id="{00833AB8-2C1A-442B-A97F-0809079822E2}"/>
               </a:ext>
             </a:extLst>
           </p:cNvPr>
@@ -1313,7 +1326,7 @@
           <p:cNvPr id="2" name="Titel 1">
             <a:extLst>
               <a:ext uri="{FF2B5EF4-FFF2-40B4-BE49-F238E27FC236}">
-                <a16:creationId xmlns:a16="http://schemas.microsoft.com/office/drawing/2014/main" xmlns="" id="{956F9D96-927A-4A89-ADFD-8CC626C17397}"/>
+                <a16:creationId xmlns:a16="http://schemas.microsoft.com/office/drawing/2014/main" id="{956F9D96-927A-4A89-ADFD-8CC626C17397}"/>
               </a:ext>
             </a:extLst>
           </p:cNvPr>
@@ -1350,7 +1363,7 @@
           <p:cNvPr id="3" name="Textplatzhalter 2">
             <a:extLst>
               <a:ext uri="{FF2B5EF4-FFF2-40B4-BE49-F238E27FC236}">
-                <a16:creationId xmlns:a16="http://schemas.microsoft.com/office/drawing/2014/main" xmlns="" id="{F42133FA-6604-4F55-B27F-C9A2A1B4D3FA}"/>
+                <a16:creationId xmlns:a16="http://schemas.microsoft.com/office/drawing/2014/main" id="{F42133FA-6604-4F55-B27F-C9A2A1B4D3FA}"/>
               </a:ext>
             </a:extLst>
           </p:cNvPr>
@@ -1475,7 +1488,7 @@
           <p:cNvPr id="4" name="Datumsplatzhalter 3">
             <a:extLst>
               <a:ext uri="{FF2B5EF4-FFF2-40B4-BE49-F238E27FC236}">
-                <a16:creationId xmlns:a16="http://schemas.microsoft.com/office/drawing/2014/main" xmlns="" id="{05CADFBC-CB0F-4869-B981-534B2D2CCD59}"/>
+                <a16:creationId xmlns:a16="http://schemas.microsoft.com/office/drawing/2014/main" id="{05CADFBC-CB0F-4869-B981-534B2D2CCD59}"/>
               </a:ext>
             </a:extLst>
           </p:cNvPr>
@@ -1504,7 +1517,7 @@
           <p:cNvPr id="5" name="Fußzeilenplatzhalter 4">
             <a:extLst>
               <a:ext uri="{FF2B5EF4-FFF2-40B4-BE49-F238E27FC236}">
-                <a16:creationId xmlns:a16="http://schemas.microsoft.com/office/drawing/2014/main" xmlns="" id="{8A1D6A0D-86DF-4060-8AFE-D1896AD82B52}"/>
+                <a16:creationId xmlns:a16="http://schemas.microsoft.com/office/drawing/2014/main" id="{8A1D6A0D-86DF-4060-8AFE-D1896AD82B52}"/>
               </a:ext>
             </a:extLst>
           </p:cNvPr>
@@ -1529,7 +1542,7 @@
           <p:cNvPr id="6" name="Foliennummernplatzhalter 5">
             <a:extLst>
               <a:ext uri="{FF2B5EF4-FFF2-40B4-BE49-F238E27FC236}">
-                <a16:creationId xmlns:a16="http://schemas.microsoft.com/office/drawing/2014/main" xmlns="" id="{10AFF1E1-5FF4-4E86-B1A7-EF1E39D8192A}"/>
+                <a16:creationId xmlns:a16="http://schemas.microsoft.com/office/drawing/2014/main" id="{10AFF1E1-5FF4-4E86-B1A7-EF1E39D8192A}"/>
               </a:ext>
             </a:extLst>
           </p:cNvPr>
@@ -1588,7 +1601,7 @@
           <p:cNvPr id="2" name="Titel 1">
             <a:extLst>
               <a:ext uri="{FF2B5EF4-FFF2-40B4-BE49-F238E27FC236}">
-                <a16:creationId xmlns:a16="http://schemas.microsoft.com/office/drawing/2014/main" xmlns="" id="{C6C4E42D-3308-4DE0-BA24-B7AD5D1D8039}"/>
+                <a16:creationId xmlns:a16="http://schemas.microsoft.com/office/drawing/2014/main" id="{C6C4E42D-3308-4DE0-BA24-B7AD5D1D8039}"/>
               </a:ext>
             </a:extLst>
           </p:cNvPr>
@@ -1616,7 +1629,7 @@
           <p:cNvPr id="3" name="Inhaltsplatzhalter 2">
             <a:extLst>
               <a:ext uri="{FF2B5EF4-FFF2-40B4-BE49-F238E27FC236}">
-                <a16:creationId xmlns:a16="http://schemas.microsoft.com/office/drawing/2014/main" xmlns="" id="{11FDE636-09CD-4DCF-A9FF-3E71909DC226}"/>
+                <a16:creationId xmlns:a16="http://schemas.microsoft.com/office/drawing/2014/main" id="{11FDE636-09CD-4DCF-A9FF-3E71909DC226}"/>
               </a:ext>
             </a:extLst>
           </p:cNvPr>
@@ -1678,7 +1691,7 @@
           <p:cNvPr id="4" name="Inhaltsplatzhalter 3">
             <a:extLst>
               <a:ext uri="{FF2B5EF4-FFF2-40B4-BE49-F238E27FC236}">
-                <a16:creationId xmlns:a16="http://schemas.microsoft.com/office/drawing/2014/main" xmlns="" id="{B005AEE1-8A1C-4B28-941A-0AB6F6D08161}"/>
+                <a16:creationId xmlns:a16="http://schemas.microsoft.com/office/drawing/2014/main" id="{B005AEE1-8A1C-4B28-941A-0AB6F6D08161}"/>
               </a:ext>
             </a:extLst>
           </p:cNvPr>
@@ -1740,7 +1753,7 @@
           <p:cNvPr id="5" name="Datumsplatzhalter 4">
             <a:extLst>
               <a:ext uri="{FF2B5EF4-FFF2-40B4-BE49-F238E27FC236}">
-                <a16:creationId xmlns:a16="http://schemas.microsoft.com/office/drawing/2014/main" xmlns="" id="{7AD9A30A-4767-4F13-82BB-0A8B31B31605}"/>
+                <a16:creationId xmlns:a16="http://schemas.microsoft.com/office/drawing/2014/main" id="{7AD9A30A-4767-4F13-82BB-0A8B31B31605}"/>
               </a:ext>
             </a:extLst>
           </p:cNvPr>
@@ -1769,7 +1782,7 @@
           <p:cNvPr id="6" name="Fußzeilenplatzhalter 5">
             <a:extLst>
               <a:ext uri="{FF2B5EF4-FFF2-40B4-BE49-F238E27FC236}">
-                <a16:creationId xmlns:a16="http://schemas.microsoft.com/office/drawing/2014/main" xmlns="" id="{BD10C44B-9F92-408F-B664-78F1913DB5DB}"/>
+                <a16:creationId xmlns:a16="http://schemas.microsoft.com/office/drawing/2014/main" id="{BD10C44B-9F92-408F-B664-78F1913DB5DB}"/>
               </a:ext>
             </a:extLst>
           </p:cNvPr>
@@ -1794,7 +1807,7 @@
           <p:cNvPr id="7" name="Foliennummernplatzhalter 6">
             <a:extLst>
               <a:ext uri="{FF2B5EF4-FFF2-40B4-BE49-F238E27FC236}">
-                <a16:creationId xmlns:a16="http://schemas.microsoft.com/office/drawing/2014/main" xmlns="" id="{B4231662-FA54-45C8-AFE2-2D1FC8B2C2CC}"/>
+                <a16:creationId xmlns:a16="http://schemas.microsoft.com/office/drawing/2014/main" id="{B4231662-FA54-45C8-AFE2-2D1FC8B2C2CC}"/>
               </a:ext>
             </a:extLst>
           </p:cNvPr>
@@ -1853,7 +1866,7 @@
           <p:cNvPr id="2" name="Titel 1">
             <a:extLst>
               <a:ext uri="{FF2B5EF4-FFF2-40B4-BE49-F238E27FC236}">
-                <a16:creationId xmlns:a16="http://schemas.microsoft.com/office/drawing/2014/main" xmlns="" id="{3A5DAE73-B303-45CB-AF46-6105E4887793}"/>
+                <a16:creationId xmlns:a16="http://schemas.microsoft.com/office/drawing/2014/main" id="{3A5DAE73-B303-45CB-AF46-6105E4887793}"/>
               </a:ext>
             </a:extLst>
           </p:cNvPr>
@@ -1886,7 +1899,7 @@
           <p:cNvPr id="3" name="Textplatzhalter 2">
             <a:extLst>
               <a:ext uri="{FF2B5EF4-FFF2-40B4-BE49-F238E27FC236}">
-                <a16:creationId xmlns:a16="http://schemas.microsoft.com/office/drawing/2014/main" xmlns="" id="{BED2D75D-BCA7-4C5E-B219-DB7BA43E8560}"/>
+                <a16:creationId xmlns:a16="http://schemas.microsoft.com/office/drawing/2014/main" id="{BED2D75D-BCA7-4C5E-B219-DB7BA43E8560}"/>
               </a:ext>
             </a:extLst>
           </p:cNvPr>
@@ -1957,7 +1970,7 @@
           <p:cNvPr id="4" name="Inhaltsplatzhalter 3">
             <a:extLst>
               <a:ext uri="{FF2B5EF4-FFF2-40B4-BE49-F238E27FC236}">
-                <a16:creationId xmlns:a16="http://schemas.microsoft.com/office/drawing/2014/main" xmlns="" id="{A96CE067-37F7-45E7-BD13-5129B6A25FD9}"/>
+                <a16:creationId xmlns:a16="http://schemas.microsoft.com/office/drawing/2014/main" id="{A96CE067-37F7-45E7-BD13-5129B6A25FD9}"/>
               </a:ext>
             </a:extLst>
           </p:cNvPr>
@@ -2019,7 +2032,7 @@
           <p:cNvPr id="5" name="Textplatzhalter 4">
             <a:extLst>
               <a:ext uri="{FF2B5EF4-FFF2-40B4-BE49-F238E27FC236}">
-                <a16:creationId xmlns:a16="http://schemas.microsoft.com/office/drawing/2014/main" xmlns="" id="{1EBDC7A2-3A5D-41C5-ACA8-7B89D4AA7A20}"/>
+                <a16:creationId xmlns:a16="http://schemas.microsoft.com/office/drawing/2014/main" id="{1EBDC7A2-3A5D-41C5-ACA8-7B89D4AA7A20}"/>
               </a:ext>
             </a:extLst>
           </p:cNvPr>
@@ -2090,7 +2103,7 @@
           <p:cNvPr id="6" name="Inhaltsplatzhalter 5">
             <a:extLst>
               <a:ext uri="{FF2B5EF4-FFF2-40B4-BE49-F238E27FC236}">
-                <a16:creationId xmlns:a16="http://schemas.microsoft.com/office/drawing/2014/main" xmlns="" id="{37D149FD-9359-46DA-9F97-1AC6BD5509AD}"/>
+                <a16:creationId xmlns:a16="http://schemas.microsoft.com/office/drawing/2014/main" id="{37D149FD-9359-46DA-9F97-1AC6BD5509AD}"/>
               </a:ext>
             </a:extLst>
           </p:cNvPr>
@@ -2152,7 +2165,7 @@
           <p:cNvPr id="7" name="Datumsplatzhalter 6">
             <a:extLst>
               <a:ext uri="{FF2B5EF4-FFF2-40B4-BE49-F238E27FC236}">
-                <a16:creationId xmlns:a16="http://schemas.microsoft.com/office/drawing/2014/main" xmlns="" id="{B6DC3EEF-9027-4704-A90B-E81C38095352}"/>
+                <a16:creationId xmlns:a16="http://schemas.microsoft.com/office/drawing/2014/main" id="{B6DC3EEF-9027-4704-A90B-E81C38095352}"/>
               </a:ext>
             </a:extLst>
           </p:cNvPr>
@@ -2181,7 +2194,7 @@
           <p:cNvPr id="8" name="Fußzeilenplatzhalter 7">
             <a:extLst>
               <a:ext uri="{FF2B5EF4-FFF2-40B4-BE49-F238E27FC236}">
-                <a16:creationId xmlns:a16="http://schemas.microsoft.com/office/drawing/2014/main" xmlns="" id="{40770A74-A517-4EBC-8CEC-B9B63E94E866}"/>
+                <a16:creationId xmlns:a16="http://schemas.microsoft.com/office/drawing/2014/main" id="{40770A74-A517-4EBC-8CEC-B9B63E94E866}"/>
               </a:ext>
             </a:extLst>
           </p:cNvPr>
@@ -2206,7 +2219,7 @@
           <p:cNvPr id="9" name="Foliennummernplatzhalter 8">
             <a:extLst>
               <a:ext uri="{FF2B5EF4-FFF2-40B4-BE49-F238E27FC236}">
-                <a16:creationId xmlns:a16="http://schemas.microsoft.com/office/drawing/2014/main" xmlns="" id="{D0706805-2FFD-4D3E-9E53-88A86A6F32B2}"/>
+                <a16:creationId xmlns:a16="http://schemas.microsoft.com/office/drawing/2014/main" id="{D0706805-2FFD-4D3E-9E53-88A86A6F32B2}"/>
               </a:ext>
             </a:extLst>
           </p:cNvPr>
@@ -2265,7 +2278,7 @@
           <p:cNvPr id="2" name="Titel 1">
             <a:extLst>
               <a:ext uri="{FF2B5EF4-FFF2-40B4-BE49-F238E27FC236}">
-                <a16:creationId xmlns:a16="http://schemas.microsoft.com/office/drawing/2014/main" xmlns="" id="{BA4E3487-5561-41BA-8D08-9E7B5CCE644E}"/>
+                <a16:creationId xmlns:a16="http://schemas.microsoft.com/office/drawing/2014/main" id="{BA4E3487-5561-41BA-8D08-9E7B5CCE644E}"/>
               </a:ext>
             </a:extLst>
           </p:cNvPr>
@@ -2293,7 +2306,7 @@
           <p:cNvPr id="3" name="Datumsplatzhalter 2">
             <a:extLst>
               <a:ext uri="{FF2B5EF4-FFF2-40B4-BE49-F238E27FC236}">
-                <a16:creationId xmlns:a16="http://schemas.microsoft.com/office/drawing/2014/main" xmlns="" id="{8968DF60-3E50-49F7-99AB-552AFD65532A}"/>
+                <a16:creationId xmlns:a16="http://schemas.microsoft.com/office/drawing/2014/main" id="{8968DF60-3E50-49F7-99AB-552AFD65532A}"/>
               </a:ext>
             </a:extLst>
           </p:cNvPr>
@@ -2322,7 +2335,7 @@
           <p:cNvPr id="4" name="Fußzeilenplatzhalter 3">
             <a:extLst>
               <a:ext uri="{FF2B5EF4-FFF2-40B4-BE49-F238E27FC236}">
-                <a16:creationId xmlns:a16="http://schemas.microsoft.com/office/drawing/2014/main" xmlns="" id="{24ACA696-D5B3-4E90-964B-0838328B8FC2}"/>
+                <a16:creationId xmlns:a16="http://schemas.microsoft.com/office/drawing/2014/main" id="{24ACA696-D5B3-4E90-964B-0838328B8FC2}"/>
               </a:ext>
             </a:extLst>
           </p:cNvPr>
@@ -2347,7 +2360,7 @@
           <p:cNvPr id="5" name="Foliennummernplatzhalter 4">
             <a:extLst>
               <a:ext uri="{FF2B5EF4-FFF2-40B4-BE49-F238E27FC236}">
-                <a16:creationId xmlns:a16="http://schemas.microsoft.com/office/drawing/2014/main" xmlns="" id="{19C4BCF6-4038-4D00-A4B9-9ECDD5A374EE}"/>
+                <a16:creationId xmlns:a16="http://schemas.microsoft.com/office/drawing/2014/main" id="{19C4BCF6-4038-4D00-A4B9-9ECDD5A374EE}"/>
               </a:ext>
             </a:extLst>
           </p:cNvPr>
@@ -2406,7 +2419,7 @@
           <p:cNvPr id="2" name="Datumsplatzhalter 1">
             <a:extLst>
               <a:ext uri="{FF2B5EF4-FFF2-40B4-BE49-F238E27FC236}">
-                <a16:creationId xmlns:a16="http://schemas.microsoft.com/office/drawing/2014/main" xmlns="" id="{AEC48B17-88EB-484C-A595-0BA4E1FD674A}"/>
+                <a16:creationId xmlns:a16="http://schemas.microsoft.com/office/drawing/2014/main" id="{AEC48B17-88EB-484C-A595-0BA4E1FD674A}"/>
               </a:ext>
             </a:extLst>
           </p:cNvPr>
@@ -2435,7 +2448,7 @@
           <p:cNvPr id="3" name="Fußzeilenplatzhalter 2">
             <a:extLst>
               <a:ext uri="{FF2B5EF4-FFF2-40B4-BE49-F238E27FC236}">
-                <a16:creationId xmlns:a16="http://schemas.microsoft.com/office/drawing/2014/main" xmlns="" id="{DD7D355A-CB8D-4499-AE0A-4CC4DCEB44A4}"/>
+                <a16:creationId xmlns:a16="http://schemas.microsoft.com/office/drawing/2014/main" id="{DD7D355A-CB8D-4499-AE0A-4CC4DCEB44A4}"/>
               </a:ext>
             </a:extLst>
           </p:cNvPr>
@@ -2460,7 +2473,7 @@
           <p:cNvPr id="4" name="Foliennummernplatzhalter 3">
             <a:extLst>
               <a:ext uri="{FF2B5EF4-FFF2-40B4-BE49-F238E27FC236}">
-                <a16:creationId xmlns:a16="http://schemas.microsoft.com/office/drawing/2014/main" xmlns="" id="{7B1D3269-2BBD-4D21-9ED2-63A4A8EF25E2}"/>
+                <a16:creationId xmlns:a16="http://schemas.microsoft.com/office/drawing/2014/main" id="{7B1D3269-2BBD-4D21-9ED2-63A4A8EF25E2}"/>
               </a:ext>
             </a:extLst>
           </p:cNvPr>
@@ -2519,7 +2532,7 @@
           <p:cNvPr id="2" name="Titel 1">
             <a:extLst>
               <a:ext uri="{FF2B5EF4-FFF2-40B4-BE49-F238E27FC236}">
-                <a16:creationId xmlns:a16="http://schemas.microsoft.com/office/drawing/2014/main" xmlns="" id="{FC581F52-3975-4FA9-BE96-EA8D3B624852}"/>
+                <a16:creationId xmlns:a16="http://schemas.microsoft.com/office/drawing/2014/main" id="{FC581F52-3975-4FA9-BE96-EA8D3B624852}"/>
               </a:ext>
             </a:extLst>
           </p:cNvPr>
@@ -2556,7 +2569,7 @@
           <p:cNvPr id="3" name="Inhaltsplatzhalter 2">
             <a:extLst>
               <a:ext uri="{FF2B5EF4-FFF2-40B4-BE49-F238E27FC236}">
-                <a16:creationId xmlns:a16="http://schemas.microsoft.com/office/drawing/2014/main" xmlns="" id="{B2B3924E-2414-4C48-B3B7-7E2E3E486192}"/>
+                <a16:creationId xmlns:a16="http://schemas.microsoft.com/office/drawing/2014/main" id="{B2B3924E-2414-4C48-B3B7-7E2E3E486192}"/>
               </a:ext>
             </a:extLst>
           </p:cNvPr>
@@ -2646,7 +2659,7 @@
           <p:cNvPr id="4" name="Textplatzhalter 3">
             <a:extLst>
               <a:ext uri="{FF2B5EF4-FFF2-40B4-BE49-F238E27FC236}">
-                <a16:creationId xmlns:a16="http://schemas.microsoft.com/office/drawing/2014/main" xmlns="" id="{EACB3FB2-A4A6-4FB2-9E14-A3CCD61D7A6B}"/>
+                <a16:creationId xmlns:a16="http://schemas.microsoft.com/office/drawing/2014/main" id="{EACB3FB2-A4A6-4FB2-9E14-A3CCD61D7A6B}"/>
               </a:ext>
             </a:extLst>
           </p:cNvPr>
@@ -2717,7 +2730,7 @@
           <p:cNvPr id="5" name="Datumsplatzhalter 4">
             <a:extLst>
               <a:ext uri="{FF2B5EF4-FFF2-40B4-BE49-F238E27FC236}">
-                <a16:creationId xmlns:a16="http://schemas.microsoft.com/office/drawing/2014/main" xmlns="" id="{68DACBD5-A2FF-427D-BEE8-CBCCD65F21C1}"/>
+                <a16:creationId xmlns:a16="http://schemas.microsoft.com/office/drawing/2014/main" id="{68DACBD5-A2FF-427D-BEE8-CBCCD65F21C1}"/>
               </a:ext>
             </a:extLst>
           </p:cNvPr>
@@ -2746,7 +2759,7 @@
           <p:cNvPr id="6" name="Fußzeilenplatzhalter 5">
             <a:extLst>
               <a:ext uri="{FF2B5EF4-FFF2-40B4-BE49-F238E27FC236}">
-                <a16:creationId xmlns:a16="http://schemas.microsoft.com/office/drawing/2014/main" xmlns="" id="{F324C1D6-78A1-4233-A09E-EED18A6B2CB5}"/>
+                <a16:creationId xmlns:a16="http://schemas.microsoft.com/office/drawing/2014/main" id="{F324C1D6-78A1-4233-A09E-EED18A6B2CB5}"/>
               </a:ext>
             </a:extLst>
           </p:cNvPr>
@@ -2771,7 +2784,7 @@
           <p:cNvPr id="7" name="Foliennummernplatzhalter 6">
             <a:extLst>
               <a:ext uri="{FF2B5EF4-FFF2-40B4-BE49-F238E27FC236}">
-                <a16:creationId xmlns:a16="http://schemas.microsoft.com/office/drawing/2014/main" xmlns="" id="{57FCC88B-313F-462C-8A6B-C2773BB05502}"/>
+                <a16:creationId xmlns:a16="http://schemas.microsoft.com/office/drawing/2014/main" id="{57FCC88B-313F-462C-8A6B-C2773BB05502}"/>
               </a:ext>
             </a:extLst>
           </p:cNvPr>
@@ -2830,7 +2843,7 @@
           <p:cNvPr id="2" name="Titel 1">
             <a:extLst>
               <a:ext uri="{FF2B5EF4-FFF2-40B4-BE49-F238E27FC236}">
-                <a16:creationId xmlns:a16="http://schemas.microsoft.com/office/drawing/2014/main" xmlns="" id="{36D56AF7-C3AD-4830-976E-4C6B44708D36}"/>
+                <a16:creationId xmlns:a16="http://schemas.microsoft.com/office/drawing/2014/main" id="{36D56AF7-C3AD-4830-976E-4C6B44708D36}"/>
               </a:ext>
             </a:extLst>
           </p:cNvPr>
@@ -2867,7 +2880,7 @@
           <p:cNvPr id="3" name="Bildplatzhalter 2">
             <a:extLst>
               <a:ext uri="{FF2B5EF4-FFF2-40B4-BE49-F238E27FC236}">
-                <a16:creationId xmlns:a16="http://schemas.microsoft.com/office/drawing/2014/main" xmlns="" id="{435E9458-5F05-4CCD-9FEA-EBC19D05FF0E}"/>
+                <a16:creationId xmlns:a16="http://schemas.microsoft.com/office/drawing/2014/main" id="{435E9458-5F05-4CCD-9FEA-EBC19D05FF0E}"/>
               </a:ext>
             </a:extLst>
           </p:cNvPr>
@@ -2934,7 +2947,7 @@
           <p:cNvPr id="4" name="Textplatzhalter 3">
             <a:extLst>
               <a:ext uri="{FF2B5EF4-FFF2-40B4-BE49-F238E27FC236}">
-                <a16:creationId xmlns:a16="http://schemas.microsoft.com/office/drawing/2014/main" xmlns="" id="{EC51E862-2DF8-47BB-A6EE-139F7BF9622E}"/>
+                <a16:creationId xmlns:a16="http://schemas.microsoft.com/office/drawing/2014/main" id="{EC51E862-2DF8-47BB-A6EE-139F7BF9622E}"/>
               </a:ext>
             </a:extLst>
           </p:cNvPr>
@@ -3005,7 +3018,7 @@
           <p:cNvPr id="5" name="Datumsplatzhalter 4">
             <a:extLst>
               <a:ext uri="{FF2B5EF4-FFF2-40B4-BE49-F238E27FC236}">
-                <a16:creationId xmlns:a16="http://schemas.microsoft.com/office/drawing/2014/main" xmlns="" id="{FF3A1578-36AE-488E-9122-1279759930C1}"/>
+                <a16:creationId xmlns:a16="http://schemas.microsoft.com/office/drawing/2014/main" id="{FF3A1578-36AE-488E-9122-1279759930C1}"/>
               </a:ext>
             </a:extLst>
           </p:cNvPr>
@@ -3034,7 +3047,7 @@
           <p:cNvPr id="6" name="Fußzeilenplatzhalter 5">
             <a:extLst>
               <a:ext uri="{FF2B5EF4-FFF2-40B4-BE49-F238E27FC236}">
-                <a16:creationId xmlns:a16="http://schemas.microsoft.com/office/drawing/2014/main" xmlns="" id="{38CC6F54-CEE8-43AF-904C-CF6ED15DDE85}"/>
+                <a16:creationId xmlns:a16="http://schemas.microsoft.com/office/drawing/2014/main" id="{38CC6F54-CEE8-43AF-904C-CF6ED15DDE85}"/>
               </a:ext>
             </a:extLst>
           </p:cNvPr>
@@ -3059,7 +3072,7 @@
           <p:cNvPr id="7" name="Foliennummernplatzhalter 6">
             <a:extLst>
               <a:ext uri="{FF2B5EF4-FFF2-40B4-BE49-F238E27FC236}">
-                <a16:creationId xmlns:a16="http://schemas.microsoft.com/office/drawing/2014/main" xmlns="" id="{04163E62-E78C-4DF5-829A-8C56EBD64B61}"/>
+                <a16:creationId xmlns:a16="http://schemas.microsoft.com/office/drawing/2014/main" id="{04163E62-E78C-4DF5-829A-8C56EBD64B61}"/>
               </a:ext>
             </a:extLst>
           </p:cNvPr>
@@ -3123,7 +3136,7 @@
           <p:cNvPr id="2" name="Titelplatzhalter 1">
             <a:extLst>
               <a:ext uri="{FF2B5EF4-FFF2-40B4-BE49-F238E27FC236}">
-                <a16:creationId xmlns:a16="http://schemas.microsoft.com/office/drawing/2014/main" xmlns="" id="{038250E5-2EEE-4B85-9DDD-569F4D393367}"/>
+                <a16:creationId xmlns:a16="http://schemas.microsoft.com/office/drawing/2014/main" id="{038250E5-2EEE-4B85-9DDD-569F4D393367}"/>
               </a:ext>
             </a:extLst>
           </p:cNvPr>
@@ -3161,7 +3174,7 @@
           <p:cNvPr id="3" name="Textplatzhalter 2">
             <a:extLst>
               <a:ext uri="{FF2B5EF4-FFF2-40B4-BE49-F238E27FC236}">
-                <a16:creationId xmlns:a16="http://schemas.microsoft.com/office/drawing/2014/main" xmlns="" id="{75D71823-059B-41EF-ADCD-F97848171804}"/>
+                <a16:creationId xmlns:a16="http://schemas.microsoft.com/office/drawing/2014/main" id="{75D71823-059B-41EF-ADCD-F97848171804}"/>
               </a:ext>
             </a:extLst>
           </p:cNvPr>
@@ -3228,7 +3241,7 @@
           <p:cNvPr id="4" name="Datumsplatzhalter 3">
             <a:extLst>
               <a:ext uri="{FF2B5EF4-FFF2-40B4-BE49-F238E27FC236}">
-                <a16:creationId xmlns:a16="http://schemas.microsoft.com/office/drawing/2014/main" xmlns="" id="{8C5047C6-EFE3-4D48-9F8F-85BD94BD0CC1}"/>
+                <a16:creationId xmlns:a16="http://schemas.microsoft.com/office/drawing/2014/main" id="{8C5047C6-EFE3-4D48-9F8F-85BD94BD0CC1}"/>
               </a:ext>
             </a:extLst>
           </p:cNvPr>
@@ -3275,7 +3288,7 @@
           <p:cNvPr id="5" name="Fußzeilenplatzhalter 4">
             <a:extLst>
               <a:ext uri="{FF2B5EF4-FFF2-40B4-BE49-F238E27FC236}">
-                <a16:creationId xmlns:a16="http://schemas.microsoft.com/office/drawing/2014/main" xmlns="" id="{C6D49610-A521-47A8-925A-834A5755960D}"/>
+                <a16:creationId xmlns:a16="http://schemas.microsoft.com/office/drawing/2014/main" id="{C6D49610-A521-47A8-925A-834A5755960D}"/>
               </a:ext>
             </a:extLst>
           </p:cNvPr>
@@ -3318,7 +3331,7 @@
           <p:cNvPr id="6" name="Foliennummernplatzhalter 5">
             <a:extLst>
               <a:ext uri="{FF2B5EF4-FFF2-40B4-BE49-F238E27FC236}">
-                <a16:creationId xmlns:a16="http://schemas.microsoft.com/office/drawing/2014/main" xmlns="" id="{0CA0158B-9358-45E7-B1BC-2FF34922E41B}"/>
+                <a16:creationId xmlns:a16="http://schemas.microsoft.com/office/drawing/2014/main" id="{0CA0158B-9358-45E7-B1BC-2FF34922E41B}"/>
               </a:ext>
             </a:extLst>
           </p:cNvPr>
@@ -3694,7 +3707,7 @@
           <p:cNvPr id="1026" name="Picture 2" descr="Bildergebnis für fahrradständer">
             <a:extLst>
               <a:ext uri="{FF2B5EF4-FFF2-40B4-BE49-F238E27FC236}">
-                <a16:creationId xmlns:a16="http://schemas.microsoft.com/office/drawing/2014/main" xmlns="" id="{792280B7-AEC4-481F-8D58-8FB19678E52B}"/>
+                <a16:creationId xmlns:a16="http://schemas.microsoft.com/office/drawing/2014/main" id="{792280B7-AEC4-481F-8D58-8FB19678E52B}"/>
               </a:ext>
             </a:extLst>
           </p:cNvPr>
@@ -3740,7 +3753,7 @@
           <p:cNvPr id="2" name="Titel 1">
             <a:extLst>
               <a:ext uri="{FF2B5EF4-FFF2-40B4-BE49-F238E27FC236}">
-                <a16:creationId xmlns:a16="http://schemas.microsoft.com/office/drawing/2014/main" xmlns="" id="{E73663B4-6BAC-47AA-905A-0ABF56EAEB5B}"/>
+                <a16:creationId xmlns:a16="http://schemas.microsoft.com/office/drawing/2014/main" id="{E73663B4-6BAC-47AA-905A-0ABF56EAEB5B}"/>
               </a:ext>
             </a:extLst>
           </p:cNvPr>
@@ -3772,18 +3785,7 @@
                   </a:schemeClr>
                 </a:solidFill>
               </a:rPr>
-              <a:t>s</a:t>
-            </a:r>
-            <a:r>
-              <a:rPr lang="de-DE" sz="20000" b="1" u="sng" dirty="0" err="1" smtClean="0">
-                <a:solidFill>
-                  <a:schemeClr val="accent3">
-                    <a:lumMod val="40000"/>
-                    <a:lumOff val="60000"/>
-                  </a:schemeClr>
-                </a:solidFill>
-              </a:rPr>
-              <a:t>mike</a:t>
+              <a:t>smike</a:t>
             </a:r>
             <a:endParaRPr lang="de-DE" sz="20000" b="1" u="sng" dirty="0">
               <a:solidFill>
@@ -3801,7 +3803,7 @@
           <p:cNvPr id="3" name="Textfeld 2">
             <a:extLst>
               <a:ext uri="{FF2B5EF4-FFF2-40B4-BE49-F238E27FC236}">
-                <a16:creationId xmlns:a16="http://schemas.microsoft.com/office/drawing/2014/main" xmlns="" id="{81F2CB6C-03B8-4E0B-9157-5F801F5E3261}"/>
+                <a16:creationId xmlns:a16="http://schemas.microsoft.com/office/drawing/2014/main" id="{81F2CB6C-03B8-4E0B-9157-5F801F5E3261}"/>
               </a:ext>
             </a:extLst>
           </p:cNvPr>
@@ -3837,7 +3839,7 @@
           <p:cNvPr id="4" name="Textfeld 3">
             <a:extLst>
               <a:ext uri="{FF2B5EF4-FFF2-40B4-BE49-F238E27FC236}">
-                <a16:creationId xmlns:a16="http://schemas.microsoft.com/office/drawing/2014/main" xmlns="" id="{EED29B05-1A10-40AC-B4B2-DE62BDC67DED}"/>
+                <a16:creationId xmlns:a16="http://schemas.microsoft.com/office/drawing/2014/main" id="{EED29B05-1A10-40AC-B4B2-DE62BDC67DED}"/>
               </a:ext>
             </a:extLst>
           </p:cNvPr>
@@ -3923,7 +3925,7 @@
           <p:cNvPr id="2" name="Titel 1">
             <a:extLst>
               <a:ext uri="{FF2B5EF4-FFF2-40B4-BE49-F238E27FC236}">
-                <a16:creationId xmlns:a16="http://schemas.microsoft.com/office/drawing/2014/main" xmlns="" id="{A482CD03-B230-489F-890D-443D831ED384}"/>
+                <a16:creationId xmlns:a16="http://schemas.microsoft.com/office/drawing/2014/main" id="{A482CD03-B230-489F-890D-443D831ED384}"/>
               </a:ext>
             </a:extLst>
           </p:cNvPr>
@@ -3959,10 +3961,10 @@
           <p:cNvPr id="1032" name="Straight Arrow Connector 74">
             <a:extLst>
               <a:ext uri="{FF2B5EF4-FFF2-40B4-BE49-F238E27FC236}">
-                <a16:creationId xmlns:a16="http://schemas.microsoft.com/office/drawing/2014/main" xmlns="" id="{E4A809D5-3600-46D4-A466-67F2349A54FB}"/>
+                <a16:creationId xmlns:a16="http://schemas.microsoft.com/office/drawing/2014/main" id="{E4A809D5-3600-46D4-A466-67F2349A54FB}"/>
               </a:ext>
               <a:ext uri="{C183D7F6-B498-43B3-948B-1728B52AA6E4}">
-                <adec:decorative xmlns:adec="http://schemas.microsoft.com/office/drawing/2017/decorative" xmlns="" val="1"/>
+                <adec:decorative xmlns:adec="http://schemas.microsoft.com/office/drawing/2017/decorative" val="1"/>
               </a:ext>
             </a:extLst>
           </p:cNvPr>
@@ -3972,7 +3974,7 @@
           <p:nvPr>
             <p:extLst>
               <p:ext uri="{386F3935-93C4-4BCD-93E2-E3B085C9AB24}">
-                <p16:designElem xmlns:p16="http://schemas.microsoft.com/office/powerpoint/2015/main" xmlns="" val="1"/>
+                <p16:designElem xmlns:p16="http://schemas.microsoft.com/office/powerpoint/2015/main" val="1"/>
               </p:ext>
             </p:extLst>
           </p:nvPr>
@@ -4012,7 +4014,7 @@
           <p:cNvPr id="1030" name="Content Placeholder 1029">
             <a:extLst>
               <a:ext uri="{FF2B5EF4-FFF2-40B4-BE49-F238E27FC236}">
-                <a16:creationId xmlns:a16="http://schemas.microsoft.com/office/drawing/2014/main" xmlns="" id="{75982306-A9B4-4C78-B207-89054A27426E}"/>
+                <a16:creationId xmlns:a16="http://schemas.microsoft.com/office/drawing/2014/main" id="{75982306-A9B4-4C78-B207-89054A27426E}"/>
               </a:ext>
             </a:extLst>
           </p:cNvPr>
@@ -4109,7 +4111,7 @@
           <p:cNvPr id="1026" name="Picture 2" descr="Bildergebnis für Volle  Fahrradständer">
             <a:extLst>
               <a:ext uri="{FF2B5EF4-FFF2-40B4-BE49-F238E27FC236}">
-                <a16:creationId xmlns:a16="http://schemas.microsoft.com/office/drawing/2014/main" xmlns="" id="{53AADD87-C5EF-4644-8F90-8E26A4B08BC6}"/>
+                <a16:creationId xmlns:a16="http://schemas.microsoft.com/office/drawing/2014/main" id="{53AADD87-C5EF-4644-8F90-8E26A4B08BC6}"/>
               </a:ext>
             </a:extLst>
           </p:cNvPr>
@@ -4263,10 +4265,10 @@
           <p:cNvPr id="73" name="Rectangle 72">
             <a:extLst>
               <a:ext uri="{FF2B5EF4-FFF2-40B4-BE49-F238E27FC236}">
-                <a16:creationId xmlns:a16="http://schemas.microsoft.com/office/drawing/2014/main" xmlns="" id="{4038CB10-1F5C-4D54-9DF7-12586DE5B007}"/>
+                <a16:creationId xmlns:a16="http://schemas.microsoft.com/office/drawing/2014/main" id="{4038CB10-1F5C-4D54-9DF7-12586DE5B007}"/>
               </a:ext>
               <a:ext uri="{C183D7F6-B498-43B3-948B-1728B52AA6E4}">
-                <adec:decorative xmlns:adec="http://schemas.microsoft.com/office/drawing/2017/decorative" xmlns="" val="1"/>
+                <adec:decorative xmlns:adec="http://schemas.microsoft.com/office/drawing/2017/decorative" val="1"/>
               </a:ext>
             </a:extLst>
           </p:cNvPr>
@@ -4276,7 +4278,7 @@
           <p:nvPr>
             <p:extLst>
               <p:ext uri="{386F3935-93C4-4BCD-93E2-E3B085C9AB24}">
-                <p16:designElem xmlns:p16="http://schemas.microsoft.com/office/powerpoint/2015/main" xmlns="" val="1"/>
+                <p16:designElem xmlns:p16="http://schemas.microsoft.com/office/powerpoint/2015/main" val="1"/>
               </p:ext>
             </p:extLst>
           </p:nvPr>
@@ -4355,7 +4357,7 @@
           <p:cNvPr id="2" name="Titel 1">
             <a:extLst>
               <a:ext uri="{FF2B5EF4-FFF2-40B4-BE49-F238E27FC236}">
-                <a16:creationId xmlns:a16="http://schemas.microsoft.com/office/drawing/2014/main" xmlns="" id="{C0096E31-A51A-43AF-9593-FFB68F3E73A5}"/>
+                <a16:creationId xmlns:a16="http://schemas.microsoft.com/office/drawing/2014/main" id="{C0096E31-A51A-43AF-9593-FFB68F3E73A5}"/>
               </a:ext>
             </a:extLst>
           </p:cNvPr>
@@ -4395,10 +4397,10 @@
           <p:cNvPr id="75" name="Rectangle 74">
             <a:extLst>
               <a:ext uri="{FF2B5EF4-FFF2-40B4-BE49-F238E27FC236}">
-                <a16:creationId xmlns:a16="http://schemas.microsoft.com/office/drawing/2014/main" xmlns="" id="{73ED6512-6858-4552-B699-9A97FE9A4EA2}"/>
+                <a16:creationId xmlns:a16="http://schemas.microsoft.com/office/drawing/2014/main" id="{73ED6512-6858-4552-B699-9A97FE9A4EA2}"/>
               </a:ext>
               <a:ext uri="{C183D7F6-B498-43B3-948B-1728B52AA6E4}">
-                <adec:decorative xmlns:adec="http://schemas.microsoft.com/office/drawing/2017/decorative" xmlns="" val="1"/>
+                <adec:decorative xmlns:adec="http://schemas.microsoft.com/office/drawing/2017/decorative" val="1"/>
               </a:ext>
             </a:extLst>
           </p:cNvPr>
@@ -4408,7 +4410,7 @@
           <p:nvPr>
             <p:extLst>
               <p:ext uri="{386F3935-93C4-4BCD-93E2-E3B085C9AB24}">
-                <p16:designElem xmlns:p16="http://schemas.microsoft.com/office/powerpoint/2015/main" xmlns="" val="1"/>
+                <p16:designElem xmlns:p16="http://schemas.microsoft.com/office/powerpoint/2015/main" val="1"/>
               </p:ext>
             </p:extLst>
           </p:nvPr>
@@ -4487,7 +4489,7 @@
           <p:cNvPr id="2054" name="Content Placeholder 2053">
             <a:extLst>
               <a:ext uri="{FF2B5EF4-FFF2-40B4-BE49-F238E27FC236}">
-                <a16:creationId xmlns:a16="http://schemas.microsoft.com/office/drawing/2014/main" xmlns="" id="{FD124D06-5469-4B17-851A-5917A2B5EF1D}"/>
+                <a16:creationId xmlns:a16="http://schemas.microsoft.com/office/drawing/2014/main" id="{FD124D06-5469-4B17-851A-5917A2B5EF1D}"/>
               </a:ext>
             </a:extLst>
           </p:cNvPr>
@@ -4529,7 +4531,7 @@
           <p:cNvPr id="5" name="Gerade Verbindung mit Pfeil 4">
             <a:extLst>
               <a:ext uri="{FF2B5EF4-FFF2-40B4-BE49-F238E27FC236}">
-                <a16:creationId xmlns:a16="http://schemas.microsoft.com/office/drawing/2014/main" xmlns="" id="{217EAFD5-E22D-4D4D-B533-BD770401113E}"/>
+                <a16:creationId xmlns:a16="http://schemas.microsoft.com/office/drawing/2014/main" id="{217EAFD5-E22D-4D4D-B533-BD770401113E}"/>
               </a:ext>
             </a:extLst>
           </p:cNvPr>
@@ -4581,7 +4583,7 @@
           <p:cNvPr id="8" name="Textfeld 7">
             <a:extLst>
               <a:ext uri="{FF2B5EF4-FFF2-40B4-BE49-F238E27FC236}">
-                <a16:creationId xmlns:a16="http://schemas.microsoft.com/office/drawing/2014/main" xmlns="" id="{55647A7C-7509-4FF4-8B41-D4997FEDB3F7}"/>
+                <a16:creationId xmlns:a16="http://schemas.microsoft.com/office/drawing/2014/main" id="{55647A7C-7509-4FF4-8B41-D4997FEDB3F7}"/>
               </a:ext>
             </a:extLst>
           </p:cNvPr>
@@ -4620,7 +4622,7 @@
           <p:cNvPr id="10" name="Gerade Verbindung mit Pfeil 9">
             <a:extLst>
               <a:ext uri="{FF2B5EF4-FFF2-40B4-BE49-F238E27FC236}">
-                <a16:creationId xmlns:a16="http://schemas.microsoft.com/office/drawing/2014/main" xmlns="" id="{B2D5A565-6DB8-4F82-A555-B55D54134539}"/>
+                <a16:creationId xmlns:a16="http://schemas.microsoft.com/office/drawing/2014/main" id="{B2D5A565-6DB8-4F82-A555-B55D54134539}"/>
               </a:ext>
             </a:extLst>
           </p:cNvPr>
@@ -4672,7 +4674,7 @@
           <p:cNvPr id="12" name="Textfeld 11">
             <a:extLst>
               <a:ext uri="{FF2B5EF4-FFF2-40B4-BE49-F238E27FC236}">
-                <a16:creationId xmlns:a16="http://schemas.microsoft.com/office/drawing/2014/main" xmlns="" id="{AA3945D2-B06D-496B-AFB6-2E4042B06684}"/>
+                <a16:creationId xmlns:a16="http://schemas.microsoft.com/office/drawing/2014/main" id="{AA3945D2-B06D-496B-AFB6-2E4042B06684}"/>
               </a:ext>
             </a:extLst>
           </p:cNvPr>
@@ -4712,7 +4714,7 @@
           <p:cNvPr id="2052" name="Picture 4" descr="Bildergebnis für Parkplatzanzeige">
             <a:extLst>
               <a:ext uri="{FF2B5EF4-FFF2-40B4-BE49-F238E27FC236}">
-                <a16:creationId xmlns:a16="http://schemas.microsoft.com/office/drawing/2014/main" xmlns="" id="{2AE19BB4-B7BB-41CC-9DB1-49D42D635D3A}"/>
+                <a16:creationId xmlns:a16="http://schemas.microsoft.com/office/drawing/2014/main" id="{2AE19BB4-B7BB-41CC-9DB1-49D42D635D3A}"/>
               </a:ext>
             </a:extLst>
           </p:cNvPr>
@@ -4797,7 +4799,7 @@
           <p:cNvPr id="3074" name="Picture 2" descr="Bildergebnis für Server">
             <a:extLst>
               <a:ext uri="{FF2B5EF4-FFF2-40B4-BE49-F238E27FC236}">
-                <a16:creationId xmlns:a16="http://schemas.microsoft.com/office/drawing/2014/main" xmlns="" id="{475D5A10-1B58-4A42-A25E-0C3F05290EA2}"/>
+                <a16:creationId xmlns:a16="http://schemas.microsoft.com/office/drawing/2014/main" id="{475D5A10-1B58-4A42-A25E-0C3F05290EA2}"/>
               </a:ext>
             </a:extLst>
           </p:cNvPr>
@@ -4846,7 +4848,7 @@
           <p:cNvPr id="3076" name="Picture 4" descr="Bildergebnis für fahrradständer">
             <a:extLst>
               <a:ext uri="{FF2B5EF4-FFF2-40B4-BE49-F238E27FC236}">
-                <a16:creationId xmlns:a16="http://schemas.microsoft.com/office/drawing/2014/main" xmlns="" id="{7A6A785C-E355-424A-92B2-C4B3AB78B1DF}"/>
+                <a16:creationId xmlns:a16="http://schemas.microsoft.com/office/drawing/2014/main" id="{7A6A785C-E355-424A-92B2-C4B3AB78B1DF}"/>
               </a:ext>
             </a:extLst>
           </p:cNvPr>
@@ -4893,7 +4895,7 @@
           <p:cNvPr id="10" name="Gerade Verbindung mit Pfeil 9">
             <a:extLst>
               <a:ext uri="{FF2B5EF4-FFF2-40B4-BE49-F238E27FC236}">
-                <a16:creationId xmlns:a16="http://schemas.microsoft.com/office/drawing/2014/main" xmlns="" id="{B54AC8FD-23B9-434C-9A41-C0CE24C5D4D3}"/>
+                <a16:creationId xmlns:a16="http://schemas.microsoft.com/office/drawing/2014/main" id="{B54AC8FD-23B9-434C-9A41-C0CE24C5D4D3}"/>
               </a:ext>
             </a:extLst>
           </p:cNvPr>
@@ -4944,7 +4946,7 @@
           <p:cNvPr id="3078" name="Picture 6" descr="Bildergebnis für smartphone">
             <a:extLst>
               <a:ext uri="{FF2B5EF4-FFF2-40B4-BE49-F238E27FC236}">
-                <a16:creationId xmlns:a16="http://schemas.microsoft.com/office/drawing/2014/main" xmlns="" id="{A66DB5B6-DBDA-4E7B-B42D-A9386CDF8C88}"/>
+                <a16:creationId xmlns:a16="http://schemas.microsoft.com/office/drawing/2014/main" id="{A66DB5B6-DBDA-4E7B-B42D-A9386CDF8C88}"/>
               </a:ext>
             </a:extLst>
           </p:cNvPr>
@@ -4991,7 +4993,7 @@
           <p:cNvPr id="12" name="Gerade Verbindung mit Pfeil 11">
             <a:extLst>
               <a:ext uri="{FF2B5EF4-FFF2-40B4-BE49-F238E27FC236}">
-                <a16:creationId xmlns:a16="http://schemas.microsoft.com/office/drawing/2014/main" xmlns="" id="{74094A7E-DFAC-495B-B345-5F9F493230BC}"/>
+                <a16:creationId xmlns:a16="http://schemas.microsoft.com/office/drawing/2014/main" id="{74094A7E-DFAC-495B-B345-5F9F493230BC}"/>
               </a:ext>
             </a:extLst>
           </p:cNvPr>
@@ -5040,7 +5042,7 @@
           <p:cNvPr id="3080" name="Picture 8" descr="Bildergebnis für Parkplatzanzeige">
             <a:extLst>
               <a:ext uri="{FF2B5EF4-FFF2-40B4-BE49-F238E27FC236}">
-                <a16:creationId xmlns:a16="http://schemas.microsoft.com/office/drawing/2014/main" xmlns="" id="{1B41B3E9-79C3-4481-991A-26CD7735A1E4}"/>
+                <a16:creationId xmlns:a16="http://schemas.microsoft.com/office/drawing/2014/main" id="{1B41B3E9-79C3-4481-991A-26CD7735A1E4}"/>
               </a:ext>
             </a:extLst>
           </p:cNvPr>
@@ -5087,7 +5089,7 @@
           <p:cNvPr id="14" name="Gerade Verbindung mit Pfeil 13">
             <a:extLst>
               <a:ext uri="{FF2B5EF4-FFF2-40B4-BE49-F238E27FC236}">
-                <a16:creationId xmlns:a16="http://schemas.microsoft.com/office/drawing/2014/main" xmlns="" id="{8464FE05-F143-47FD-822F-F783EF390E50}"/>
+                <a16:creationId xmlns:a16="http://schemas.microsoft.com/office/drawing/2014/main" id="{8464FE05-F143-47FD-822F-F783EF390E50}"/>
               </a:ext>
             </a:extLst>
           </p:cNvPr>
@@ -5136,7 +5138,7 @@
           <p:cNvPr id="15" name="Textfeld 14">
             <a:extLst>
               <a:ext uri="{FF2B5EF4-FFF2-40B4-BE49-F238E27FC236}">
-                <a16:creationId xmlns:a16="http://schemas.microsoft.com/office/drawing/2014/main" xmlns="" id="{54338B84-E115-447B-8D17-E744EEF6CC98}"/>
+                <a16:creationId xmlns:a16="http://schemas.microsoft.com/office/drawing/2014/main" id="{54338B84-E115-447B-8D17-E744EEF6CC98}"/>
               </a:ext>
             </a:extLst>
           </p:cNvPr>
@@ -5172,7 +5174,7 @@
           <p:cNvPr id="16" name="Textfeld 15">
             <a:extLst>
               <a:ext uri="{FF2B5EF4-FFF2-40B4-BE49-F238E27FC236}">
-                <a16:creationId xmlns:a16="http://schemas.microsoft.com/office/drawing/2014/main" xmlns="" id="{D16F8E7A-198C-413E-96F2-A5752B12E336}"/>
+                <a16:creationId xmlns:a16="http://schemas.microsoft.com/office/drawing/2014/main" id="{D16F8E7A-198C-413E-96F2-A5752B12E336}"/>
               </a:ext>
             </a:extLst>
           </p:cNvPr>
@@ -5208,7 +5210,7 @@
           <p:cNvPr id="17" name="Textfeld 16">
             <a:extLst>
               <a:ext uri="{FF2B5EF4-FFF2-40B4-BE49-F238E27FC236}">
-                <a16:creationId xmlns:a16="http://schemas.microsoft.com/office/drawing/2014/main" xmlns="" id="{8E7FAC09-EF65-49BA-BAAC-8A2456107294}"/>
+                <a16:creationId xmlns:a16="http://schemas.microsoft.com/office/drawing/2014/main" id="{8E7FAC09-EF65-49BA-BAAC-8A2456107294}"/>
               </a:ext>
             </a:extLst>
           </p:cNvPr>
@@ -5244,7 +5246,7 @@
           <p:cNvPr id="18" name="Textfeld 17">
             <a:extLst>
               <a:ext uri="{FF2B5EF4-FFF2-40B4-BE49-F238E27FC236}">
-                <a16:creationId xmlns:a16="http://schemas.microsoft.com/office/drawing/2014/main" xmlns="" id="{626C4439-B8E8-452C-A414-0F9F8A62E46D}"/>
+                <a16:creationId xmlns:a16="http://schemas.microsoft.com/office/drawing/2014/main" id="{626C4439-B8E8-452C-A414-0F9F8A62E46D}"/>
               </a:ext>
             </a:extLst>
           </p:cNvPr>
@@ -5280,7 +5282,7 @@
           <p:cNvPr id="2" name="Textfeld 1">
             <a:extLst>
               <a:ext uri="{FF2B5EF4-FFF2-40B4-BE49-F238E27FC236}">
-                <a16:creationId xmlns:a16="http://schemas.microsoft.com/office/drawing/2014/main" xmlns="" id="{99B44706-D2B4-4C8C-8F6C-5F001808A77E}"/>
+                <a16:creationId xmlns:a16="http://schemas.microsoft.com/office/drawing/2014/main" id="{99B44706-D2B4-4C8C-8F6C-5F001808A77E}"/>
               </a:ext>
             </a:extLst>
           </p:cNvPr>
@@ -5328,6 +5330,167 @@
     <p:extLst>
       <p:ext uri="{BB962C8B-B14F-4D97-AF65-F5344CB8AC3E}">
         <p14:creationId xmlns:p14="http://schemas.microsoft.com/office/powerpoint/2010/main" val="1523647669"/>
+      </p:ext>
+    </p:extLst>
+  </p:cSld>
+  <p:clrMapOvr>
+    <a:masterClrMapping/>
+  </p:clrMapOvr>
+</p:sld>
+</file>
+
+<file path=ppt/slides/slide5.xml><?xml version="1.0" encoding="utf-8"?>
+<p:sld xmlns:a="http://schemas.openxmlformats.org/drawingml/2006/main" xmlns:r="http://schemas.openxmlformats.org/officeDocument/2006/relationships" xmlns:p="http://schemas.openxmlformats.org/presentationml/2006/main">
+  <p:cSld>
+    <p:bg>
+      <p:bgPr>
+        <a:solidFill>
+          <a:schemeClr val="bg1"/>
+        </a:solidFill>
+        <a:effectLst/>
+      </p:bgPr>
+    </p:bg>
+    <p:spTree>
+      <p:nvGrpSpPr>
+        <p:cNvPr id="1" name=""/>
+        <p:cNvGrpSpPr/>
+        <p:nvPr/>
+      </p:nvGrpSpPr>
+      <p:grpSpPr>
+        <a:xfrm>
+          <a:off x="0" y="0"/>
+          <a:ext cx="0" cy="0"/>
+          <a:chOff x="0" y="0"/>
+          <a:chExt cx="0" cy="0"/>
+        </a:xfrm>
+      </p:grpSpPr>
+      <p:pic>
+        <p:nvPicPr>
+          <p:cNvPr id="5" name="Inhaltsplatzhalter 4" descr="Ein Bild, das Text, Karte enthält.&#10;&#10;Automatisch generierte Beschreibung">
+            <a:extLst>
+              <a:ext uri="{FF2B5EF4-FFF2-40B4-BE49-F238E27FC236}">
+                <a16:creationId xmlns:a16="http://schemas.microsoft.com/office/drawing/2014/main" id="{16837A02-3DE4-4E82-93EE-1655B9EA8740}"/>
+              </a:ext>
+            </a:extLst>
+          </p:cNvPr>
+          <p:cNvPicPr>
+            <a:picLocks noGrp="1" noChangeAspect="1"/>
+          </p:cNvPicPr>
+          <p:nvPr>
+            <p:ph idx="1"/>
+          </p:nvPr>
+        </p:nvPicPr>
+        <p:blipFill rotWithShape="1">
+          <a:blip r:embed="rId2">
+            <a:extLst>
+              <a:ext uri="{28A0092B-C50C-407E-A947-70E740481C1C}">
+                <a14:useLocalDpi xmlns:a14="http://schemas.microsoft.com/office/drawing/2010/main" val="0"/>
+              </a:ext>
+            </a:extLst>
+          </a:blip>
+          <a:srcRect t="2150" b="26421"/>
+          <a:stretch/>
+        </p:blipFill>
+        <p:spPr>
+          <a:xfrm>
+            <a:off x="20" y="10"/>
+            <a:ext cx="12191980" cy="6857990"/>
+          </a:xfrm>
+          <a:prstGeom prst="rect">
+            <a:avLst/>
+          </a:prstGeom>
+        </p:spPr>
+      </p:pic>
+    </p:spTree>
+    <p:extLst>
+      <p:ext uri="{BB962C8B-B14F-4D97-AF65-F5344CB8AC3E}">
+        <p14:creationId xmlns:p14="http://schemas.microsoft.com/office/powerpoint/2010/main" val="3114097396"/>
+      </p:ext>
+    </p:extLst>
+  </p:cSld>
+  <p:clrMapOvr>
+    <a:masterClrMapping/>
+  </p:clrMapOvr>
+</p:sld>
+</file>
+
+<file path=ppt/slides/slide6.xml><?xml version="1.0" encoding="utf-8"?>
+<p:sld xmlns:a="http://schemas.openxmlformats.org/drawingml/2006/main" xmlns:r="http://schemas.openxmlformats.org/officeDocument/2006/relationships" xmlns:p="http://schemas.openxmlformats.org/presentationml/2006/main">
+  <p:cSld>
+    <p:bg>
+      <p:bgPr>
+        <a:solidFill>
+          <a:schemeClr val="bg1"/>
+        </a:solidFill>
+        <a:effectLst/>
+      </p:bgPr>
+    </p:bg>
+    <p:spTree>
+      <p:nvGrpSpPr>
+        <p:cNvPr id="1" name=""/>
+        <p:cNvGrpSpPr/>
+        <p:nvPr/>
+      </p:nvGrpSpPr>
+      <p:grpSpPr>
+        <a:xfrm>
+          <a:off x="0" y="0"/>
+          <a:ext cx="0" cy="0"/>
+          <a:chOff x="0" y="0"/>
+          <a:chExt cx="0" cy="0"/>
+        </a:xfrm>
+      </p:grpSpPr>
+      <p:pic>
+        <p:nvPicPr>
+          <p:cNvPr id="1040" name="Picture 16" descr="Bildergebnis für danke für ihre aufmerksamkeit">
+            <a:extLst>
+              <a:ext uri="{FF2B5EF4-FFF2-40B4-BE49-F238E27FC236}">
+                <a16:creationId xmlns:a16="http://schemas.microsoft.com/office/drawing/2014/main" id="{84357163-1302-4BC4-ADD5-C834B3BD3F2D}"/>
+              </a:ext>
+            </a:extLst>
+          </p:cNvPr>
+          <p:cNvPicPr>
+            <a:picLocks noGrp="1" noChangeAspect="1" noChangeArrowheads="1"/>
+          </p:cNvPicPr>
+          <p:nvPr>
+            <p:ph idx="1"/>
+          </p:nvPr>
+        </p:nvPicPr>
+        <p:blipFill>
+          <a:blip r:embed="rId2">
+            <a:extLst>
+              <a:ext uri="{28A0092B-C50C-407E-A947-70E740481C1C}">
+                <a14:useLocalDpi xmlns:a14="http://schemas.microsoft.com/office/drawing/2010/main" val="0"/>
+              </a:ext>
+            </a:extLst>
+          </a:blip>
+          <a:stretch>
+            <a:fillRect/>
+          </a:stretch>
+        </p:blipFill>
+        <p:spPr bwMode="auto">
+          <a:xfrm>
+            <a:off x="2381955" y="643466"/>
+            <a:ext cx="7428089" cy="5571067"/>
+          </a:xfrm>
+          <a:prstGeom prst="rect">
+            <a:avLst/>
+          </a:prstGeom>
+          <a:noFill/>
+          <a:extLst>
+            <a:ext uri="{909E8E84-426E-40DD-AFC4-6F175D3DCCD1}">
+              <a14:hiddenFill xmlns:a14="http://schemas.microsoft.com/office/drawing/2010/main">
+                <a:solidFill>
+                  <a:srgbClr val="FFFFFF"/>
+                </a:solidFill>
+              </a14:hiddenFill>
+            </a:ext>
+          </a:extLst>
+        </p:spPr>
+      </p:pic>
+    </p:spTree>
+    <p:extLst>
+      <p:ext uri="{BB962C8B-B14F-4D97-AF65-F5344CB8AC3E}">
+        <p14:creationId xmlns:p14="http://schemas.microsoft.com/office/powerpoint/2010/main" val="2173219780"/>
       </p:ext>
     </p:extLst>
   </p:cSld>
@@ -5626,7 +5789,7 @@
   <a:extraClrSchemeLst/>
   <a:extLst>
     <a:ext uri="{05A4C25C-085E-4340-85A3-A5531E510DB2}">
-      <thm15:themeFamily xmlns:thm15="http://schemas.microsoft.com/office/thememl/2012/main" xmlns="" name="Office Theme" id="{62F939B6-93AF-4DB8-9C6B-D6C7DFDC589F}" vid="{4A3C46E8-61CC-4603-A589-7422A47A8E4A}"/>
+      <thm15:themeFamily xmlns:thm15="http://schemas.microsoft.com/office/thememl/2012/main" name="Office Theme" id="{62F939B6-93AF-4DB8-9C6B-D6C7DFDC589F}" vid="{4A3C46E8-61CC-4603-A589-7422A47A8E4A}"/>
     </a:ext>
   </a:extLst>
 </a:theme>
@@ -5921,7 +6084,7 @@
   <a:extraClrSchemeLst/>
   <a:extLst>
     <a:ext uri="{05A4C25C-085E-4340-85A3-A5531E510DB2}">
-      <thm15:themeFamily xmlns:thm15="http://schemas.microsoft.com/office/thememl/2012/main" xmlns="" name="Office Theme" id="{62F939B6-93AF-4DB8-9C6B-D6C7DFDC589F}" vid="{4A3C46E8-61CC-4603-A589-7422A47A8E4A}"/>
+      <thm15:themeFamily xmlns:thm15="http://schemas.microsoft.com/office/thememl/2012/main" name="Office Theme" id="{62F939B6-93AF-4DB8-9C6B-D6C7DFDC589F}" vid="{4A3C46E8-61CC-4603-A589-7422A47A8E4A}"/>
     </a:ext>
   </a:extLst>
 </a:theme>

</xml_diff>